<commit_message>
Minor updates in IntroToExpress presentation
</commit_message>
<xml_diff>
--- a/Presentation/IntroToExpress/IntroToExpress.pptx
+++ b/Presentation/IntroToExpress/IntroToExpress.pptx
@@ -11,10 +11,10 @@
     <p:sldMasterId id="2147483729" r:id="rId10"/>
   </p:sldMasterIdLst>
   <p:notesMasterIdLst>
-    <p:notesMasterId r:id="rId31"/>
+    <p:notesMasterId r:id="rId24"/>
   </p:notesMasterIdLst>
   <p:handoutMasterIdLst>
-    <p:handoutMasterId r:id="rId32"/>
+    <p:handoutMasterId r:id="rId25"/>
   </p:handoutMasterIdLst>
   <p:sldIdLst>
     <p:sldId id="297" r:id="rId11"/>
@@ -28,15 +28,8 @@
     <p:sldId id="296" r:id="rId19"/>
     <p:sldId id="286" r:id="rId20"/>
     <p:sldId id="302" r:id="rId21"/>
-    <p:sldId id="288" r:id="rId22"/>
-    <p:sldId id="289" r:id="rId23"/>
-    <p:sldId id="290" r:id="rId24"/>
-    <p:sldId id="291" r:id="rId25"/>
-    <p:sldId id="292" r:id="rId26"/>
-    <p:sldId id="293" r:id="rId27"/>
-    <p:sldId id="294" r:id="rId28"/>
-    <p:sldId id="283" r:id="rId29"/>
-    <p:sldId id="269" r:id="rId30"/>
+    <p:sldId id="283" r:id="rId22"/>
+    <p:sldId id="269" r:id="rId23"/>
   </p:sldIdLst>
   <p:sldSz cx="12192000" cy="6858000"/>
   <p:notesSz cx="6858000" cy="9144000"/>
@@ -228,7 +221,7 @@
           <a:p>
             <a:fld id="{312E7B4A-039C-48A2-9B2C-AF16AA3873D8}" type="datetimeFigureOut">
               <a:rPr lang="en-US" smtClean="0"/>
-              <a:t>07/07/2015</a:t>
+              <a:t>20/07/2015</a:t>
             </a:fld>
             <a:endParaRPr lang="en-US"/>
           </a:p>
@@ -393,7 +386,7 @@
           <a:p>
             <a:fld id="{DA005A0C-54D9-45AA-87D4-C551D08DFCE1}" type="datetimeFigureOut">
               <a:rPr lang="en-US" smtClean="0"/>
-              <a:t>07/07/2015</a:t>
+              <a:t>20/07/2015</a:t>
             </a:fld>
             <a:endParaRPr lang="en-US"/>
           </a:p>
@@ -17156,8 +17149,8 @@
         </p:nvSpPr>
         <p:spPr>
           <a:xfrm>
-            <a:off x="560798" y="1893325"/>
-            <a:ext cx="11079822" cy="4215579"/>
+            <a:off x="560798" y="2598719"/>
+            <a:ext cx="9323431" cy="2922515"/>
           </a:xfrm>
         </p:spPr>
         <p:style>
@@ -17176,7 +17169,7 @@
         </p:style>
         <p:txBody>
           <a:bodyPr>
-            <a:normAutofit lnSpcReduction="10000"/>
+            <a:normAutofit/>
           </a:bodyPr>
           <a:lstStyle/>
           <a:p>
@@ -17190,7 +17183,7 @@
               <a:buNone/>
             </a:pPr>
             <a:r>
-              <a:rPr lang="en-US" altLang="en-US" dirty="0" err="1">
+              <a:rPr lang="en-US" altLang="en-US" sz="2400" dirty="0" err="1">
                 <a:solidFill>
                   <a:srgbClr val="0000FF"/>
                 </a:solidFill>
@@ -17200,7 +17193,7 @@
               <a:t>var</a:t>
             </a:r>
             <a:r>
-              <a:rPr lang="en-US" altLang="en-US" dirty="0">
+              <a:rPr lang="en-US" altLang="en-US" sz="2400" dirty="0">
                 <a:solidFill>
                   <a:srgbClr val="000000"/>
                 </a:solidFill>
@@ -17210,7 +17203,7 @@
               <a:t> express = require(</a:t>
             </a:r>
             <a:r>
-              <a:rPr lang="en-US" altLang="en-US" dirty="0">
+              <a:rPr lang="en-US" altLang="en-US" sz="2400" dirty="0">
                 <a:solidFill>
                   <a:srgbClr val="A31515"/>
                 </a:solidFill>
@@ -17220,7 +17213,7 @@
               <a:t>'express'</a:t>
             </a:r>
             <a:r>
-              <a:rPr lang="en-US" altLang="en-US" dirty="0">
+              <a:rPr lang="en-US" altLang="en-US" sz="2400" dirty="0">
                 <a:solidFill>
                   <a:srgbClr val="000000"/>
                 </a:solidFill>
@@ -17241,7 +17234,7 @@
               <a:buNone/>
             </a:pPr>
             <a:r>
-              <a:rPr lang="en-US" altLang="en-US" dirty="0" err="1">
+              <a:rPr lang="en-US" altLang="en-US" sz="2400" dirty="0" err="1">
                 <a:solidFill>
                   <a:srgbClr val="0000FF"/>
                 </a:solidFill>
@@ -17251,7 +17244,7 @@
               <a:t>var</a:t>
             </a:r>
             <a:r>
-              <a:rPr lang="en-US" altLang="en-US" dirty="0">
+              <a:rPr lang="en-US" altLang="en-US" sz="2400" dirty="0">
                 <a:solidFill>
                   <a:srgbClr val="000000"/>
                 </a:solidFill>
@@ -17271,7 +17264,7 @@
               </a:spcAft>
               <a:buNone/>
             </a:pPr>
-            <a:endParaRPr lang="en-US" altLang="en-US" dirty="0">
+            <a:endParaRPr lang="en-US" altLang="en-US" sz="2400" dirty="0">
               <a:solidFill>
                 <a:srgbClr val="000000"/>
               </a:solidFill>
@@ -17290,7 +17283,7 @@
               <a:buNone/>
             </a:pPr>
             <a:r>
-              <a:rPr lang="en-US" altLang="en-US" dirty="0" err="1">
+              <a:rPr lang="en-US" altLang="en-US" sz="2400" dirty="0" err="1">
                 <a:solidFill>
                   <a:srgbClr val="000000"/>
                 </a:solidFill>
@@ -17300,7 +17293,7 @@
               <a:t>app.</a:t>
             </a:r>
             <a:r>
-              <a:rPr lang="en-US" altLang="en-US" dirty="0" err="1">
+              <a:rPr lang="en-US" altLang="en-US" sz="2400" dirty="0" err="1">
                 <a:solidFill>
                   <a:srgbClr val="0000FF"/>
                 </a:solidFill>
@@ -17310,7 +17303,7 @@
               <a:t>get</a:t>
             </a:r>
             <a:r>
-              <a:rPr lang="en-US" altLang="en-US" dirty="0">
+              <a:rPr lang="en-US" altLang="en-US" sz="2400" dirty="0">
                 <a:solidFill>
                   <a:srgbClr val="000000"/>
                 </a:solidFill>
@@ -17320,7 +17313,7 @@
               <a:t>(</a:t>
             </a:r>
             <a:r>
-              <a:rPr lang="en-US" altLang="en-US" dirty="0">
+              <a:rPr lang="en-US" altLang="en-US" sz="2400" dirty="0">
                 <a:solidFill>
                   <a:srgbClr val="A31515"/>
                 </a:solidFill>
@@ -17330,7 +17323,7 @@
               <a:t>'/'</a:t>
             </a:r>
             <a:r>
-              <a:rPr lang="en-US" altLang="en-US" dirty="0">
+              <a:rPr lang="en-US" altLang="en-US" sz="2400" dirty="0">
                 <a:solidFill>
                   <a:srgbClr val="000000"/>
                 </a:solidFill>
@@ -17340,7 +17333,7 @@
               <a:t>, </a:t>
             </a:r>
             <a:r>
-              <a:rPr lang="en-US" altLang="en-US" dirty="0">
+              <a:rPr lang="en-US" altLang="en-US" sz="2400" dirty="0">
                 <a:solidFill>
                   <a:srgbClr val="0000FF"/>
                 </a:solidFill>
@@ -17350,7 +17343,7 @@
               <a:t>function</a:t>
             </a:r>
             <a:r>
-              <a:rPr lang="en-US" altLang="en-US" dirty="0">
+              <a:rPr lang="en-US" altLang="en-US" sz="2400" dirty="0">
                 <a:solidFill>
                   <a:srgbClr val="000000"/>
                 </a:solidFill>
@@ -17360,7 +17353,7 @@
               <a:t> (</a:t>
             </a:r>
             <a:r>
-              <a:rPr lang="en-US" altLang="en-US" dirty="0" err="1">
+              <a:rPr lang="en-US" altLang="en-US" sz="2400" dirty="0" err="1">
                 <a:solidFill>
                   <a:srgbClr val="000000"/>
                 </a:solidFill>
@@ -17370,7 +17363,7 @@
               <a:t>req</a:t>
             </a:r>
             <a:r>
-              <a:rPr lang="en-US" altLang="en-US" dirty="0">
+              <a:rPr lang="en-US" altLang="en-US" sz="2400" dirty="0">
                 <a:solidFill>
                   <a:srgbClr val="000000"/>
                 </a:solidFill>
@@ -17391,7 +17384,7 @@
               <a:buNone/>
             </a:pPr>
             <a:r>
-              <a:rPr lang="en-US" altLang="en-US" dirty="0">
+              <a:rPr lang="en-US" altLang="en-US" sz="2400" dirty="0">
                 <a:solidFill>
                   <a:srgbClr val="000000"/>
                 </a:solidFill>
@@ -17401,7 +17394,7 @@
               <a:t>    </a:t>
             </a:r>
             <a:r>
-              <a:rPr lang="en-US" altLang="en-US" dirty="0" err="1">
+              <a:rPr lang="en-US" altLang="en-US" sz="2400" dirty="0" err="1">
                 <a:solidFill>
                   <a:srgbClr val="000000"/>
                 </a:solidFill>
@@ -17411,7 +17404,7 @@
               <a:t>res.json</a:t>
             </a:r>
             <a:r>
-              <a:rPr lang="en-US" altLang="en-US" dirty="0">
+              <a:rPr lang="en-US" altLang="en-US" sz="2400" dirty="0">
                 <a:solidFill>
                   <a:srgbClr val="000000"/>
                 </a:solidFill>
@@ -17421,7 +17414,7 @@
               <a:t>({</a:t>
             </a:r>
             <a:r>
-              <a:rPr lang="en-US" altLang="en-US" dirty="0" err="1">
+              <a:rPr lang="en-US" altLang="en-US" sz="2400" dirty="0" err="1">
                 <a:solidFill>
                   <a:srgbClr val="000000"/>
                 </a:solidFill>
@@ -17431,7 +17424,7 @@
               <a:t>message:</a:t>
             </a:r>
             <a:r>
-              <a:rPr lang="en-US" altLang="en-US" dirty="0" err="1">
+              <a:rPr lang="en-US" altLang="en-US" sz="2400" dirty="0" err="1">
                 <a:solidFill>
                   <a:srgbClr val="A31515"/>
                 </a:solidFill>
@@ -17441,7 +17434,7 @@
               <a:t>'hooray</a:t>
             </a:r>
             <a:r>
-              <a:rPr lang="en-US" altLang="en-US" dirty="0">
+              <a:rPr lang="en-US" altLang="en-US" sz="2400" dirty="0">
                 <a:solidFill>
                   <a:srgbClr val="A31515"/>
                 </a:solidFill>
@@ -17451,7 +17444,7 @@
               <a:t>! welcome to our </a:t>
             </a:r>
             <a:r>
-              <a:rPr lang="en-US" altLang="en-US" dirty="0" err="1">
+              <a:rPr lang="en-US" altLang="en-US" sz="2400" dirty="0" err="1">
                 <a:solidFill>
                   <a:srgbClr val="A31515"/>
                 </a:solidFill>
@@ -17461,7 +17454,7 @@
               <a:t>api</a:t>
             </a:r>
             <a:r>
-              <a:rPr lang="en-US" altLang="en-US" dirty="0">
+              <a:rPr lang="en-US" altLang="en-US" sz="2400" dirty="0">
                 <a:solidFill>
                   <a:srgbClr val="A31515"/>
                 </a:solidFill>
@@ -17471,7 +17464,7 @@
               <a:t>!'</a:t>
             </a:r>
             <a:r>
-              <a:rPr lang="en-US" altLang="en-US" dirty="0">
+              <a:rPr lang="en-US" altLang="en-US" sz="2400" dirty="0">
                 <a:solidFill>
                   <a:srgbClr val="000000"/>
                 </a:solidFill>
@@ -17492,7 +17485,7 @@
               <a:buNone/>
             </a:pPr>
             <a:r>
-              <a:rPr lang="en-US" altLang="en-US" dirty="0">
+              <a:rPr lang="en-US" altLang="en-US" sz="2400" dirty="0">
                 <a:solidFill>
                   <a:srgbClr val="000000"/>
                 </a:solidFill>
@@ -17512,7 +17505,7 @@
               </a:spcAft>
               <a:buNone/>
             </a:pPr>
-            <a:endParaRPr lang="en-US" altLang="en-US" dirty="0">
+            <a:endParaRPr lang="en-US" altLang="en-US" sz="2400" dirty="0">
               <a:solidFill>
                 <a:srgbClr val="000000"/>
               </a:solidFill>
@@ -17531,7 +17524,7 @@
               <a:buNone/>
             </a:pPr>
             <a:r>
-              <a:rPr lang="en-US" altLang="en-US" dirty="0" err="1">
+              <a:rPr lang="en-US" altLang="en-US" sz="2400" dirty="0" err="1">
                 <a:solidFill>
                   <a:srgbClr val="000000"/>
                 </a:solidFill>
@@ -17541,7 +17534,7 @@
               <a:t>app.listen</a:t>
             </a:r>
             <a:r>
-              <a:rPr lang="en-US" altLang="en-US" dirty="0">
+              <a:rPr lang="en-US" altLang="en-US" sz="2400" dirty="0">
                 <a:solidFill>
                   <a:srgbClr val="000000"/>
                 </a:solidFill>
@@ -17551,7 +17544,7 @@
               <a:t>(</a:t>
             </a:r>
             <a:r>
-              <a:rPr lang="en-US" altLang="en-US" dirty="0" err="1">
+              <a:rPr lang="en-US" altLang="en-US" sz="2400" dirty="0" err="1">
                 <a:solidFill>
                   <a:srgbClr val="000000"/>
                 </a:solidFill>
@@ -17561,7 +17554,7 @@
               <a:t>process.env.PORT</a:t>
             </a:r>
             <a:r>
-              <a:rPr lang="en-US" altLang="en-US" dirty="0">
+              <a:rPr lang="en-US" altLang="en-US" sz="2400" dirty="0">
                 <a:solidFill>
                   <a:srgbClr val="000000"/>
                 </a:solidFill>
@@ -17570,12 +17563,12 @@
               </a:rPr>
               <a:t> || 8080); </a:t>
             </a:r>
-            <a:endParaRPr lang="en-US" altLang="en-US" sz="6600" dirty="0">
+            <a:endParaRPr lang="en-US" altLang="en-US" sz="4800" dirty="0">
               <a:latin typeface="Arial" panose="020B0604020202020204" pitchFamily="34" charset="0"/>
             </a:endParaRPr>
           </a:p>
           <a:p>
-            <a:endParaRPr lang="en-US" dirty="0"/>
+            <a:endParaRPr lang="en-US" sz="2400" dirty="0"/>
           </a:p>
         </p:txBody>
       </p:sp>
@@ -17683,876 +17676,6 @@
 </file>
 
 <file path=ppt/slides/slide12.xml><?xml version="1.0" encoding="utf-8"?>
-<p:sld xmlns:a="http://schemas.openxmlformats.org/drawingml/2006/main" xmlns:r="http://schemas.openxmlformats.org/officeDocument/2006/relationships" xmlns:p="http://schemas.openxmlformats.org/presentationml/2006/main" show="0">
-  <p:cSld>
-    <p:spTree>
-      <p:nvGrpSpPr>
-        <p:cNvPr id="1" name=""/>
-        <p:cNvGrpSpPr/>
-        <p:nvPr/>
-      </p:nvGrpSpPr>
-      <p:grpSpPr>
-        <a:xfrm>
-          <a:off x="0" y="0"/>
-          <a:ext cx="0" cy="0"/>
-          <a:chOff x="0" y="0"/>
-          <a:chExt cx="0" cy="0"/>
-        </a:xfrm>
-      </p:grpSpPr>
-      <p:sp>
-        <p:nvSpPr>
-          <p:cNvPr id="2" name="Title 1"/>
-          <p:cNvSpPr>
-            <a:spLocks noGrp="1"/>
-          </p:cNvSpPr>
-          <p:nvPr>
-            <p:ph type="title" idx="4294967295"/>
-          </p:nvPr>
-        </p:nvSpPr>
-        <p:spPr>
-          <a:xfrm>
-            <a:off x="666750" y="182563"/>
-            <a:ext cx="11525250" cy="1063625"/>
-          </a:xfrm>
-        </p:spPr>
-        <p:txBody>
-          <a:bodyPr/>
-          <a:lstStyle/>
-          <a:p>
-            <a:r>
-              <a:rPr lang="en-US" dirty="0" smtClean="0"/>
-              <a:t>Why use Express? </a:t>
-            </a:r>
-            <a:endParaRPr lang="en-US" dirty="0"/>
-          </a:p>
-        </p:txBody>
-      </p:sp>
-      <p:pic>
-        <p:nvPicPr>
-          <p:cNvPr id="4" name="Picture 3"/>
-          <p:cNvPicPr/>
-          <p:nvPr/>
-        </p:nvPicPr>
-        <p:blipFill>
-          <a:blip r:embed="rId2">
-            <a:extLst>
-              <a:ext uri="{28A0092B-C50C-407E-A947-70E740481C1C}">
-                <a14:useLocalDpi xmlns:a14="http://schemas.microsoft.com/office/drawing/2010/main" val="0"/>
-              </a:ext>
-            </a:extLst>
-          </a:blip>
-          <a:stretch>
-            <a:fillRect/>
-          </a:stretch>
-        </p:blipFill>
-        <p:spPr>
-          <a:xfrm>
-            <a:off x="549813" y="1083750"/>
-            <a:ext cx="8819271" cy="5248220"/>
-          </a:xfrm>
-          <a:prstGeom prst="rect">
-            <a:avLst/>
-          </a:prstGeom>
-        </p:spPr>
-      </p:pic>
-    </p:spTree>
-    <p:extLst>
-      <p:ext uri="{BB962C8B-B14F-4D97-AF65-F5344CB8AC3E}">
-        <p14:creationId xmlns:p14="http://schemas.microsoft.com/office/powerpoint/2010/main" val="1099103362"/>
-      </p:ext>
-    </p:extLst>
-  </p:cSld>
-  <p:clrMapOvr>
-    <a:masterClrMapping/>
-  </p:clrMapOvr>
-  <mc:AlternateContent xmlns:mc="http://schemas.openxmlformats.org/markup-compatibility/2006" xmlns:p14="http://schemas.microsoft.com/office/powerpoint/2010/main">
-    <mc:Choice Requires="p14">
-      <p:transition spd="med" p14:dur="700">
-        <p:fade/>
-      </p:transition>
-    </mc:Choice>
-    <mc:Fallback xmlns="">
-      <p:transition spd="med">
-        <p:fade/>
-      </p:transition>
-    </mc:Fallback>
-  </mc:AlternateContent>
-  <p:timing>
-    <p:tnLst>
-      <p:par>
-        <p:cTn id="1" dur="indefinite" restart="never" nodeType="tmRoot"/>
-      </p:par>
-    </p:tnLst>
-  </p:timing>
-</p:sld>
-</file>
-
-<file path=ppt/slides/slide13.xml><?xml version="1.0" encoding="utf-8"?>
-<p:sld xmlns:a="http://schemas.openxmlformats.org/drawingml/2006/main" xmlns:r="http://schemas.openxmlformats.org/officeDocument/2006/relationships" xmlns:p="http://schemas.openxmlformats.org/presentationml/2006/main" show="0">
-  <p:cSld>
-    <p:spTree>
-      <p:nvGrpSpPr>
-        <p:cNvPr id="1" name=""/>
-        <p:cNvGrpSpPr/>
-        <p:nvPr/>
-      </p:nvGrpSpPr>
-      <p:grpSpPr>
-        <a:xfrm>
-          <a:off x="0" y="0"/>
-          <a:ext cx="0" cy="0"/>
-          <a:chOff x="0" y="0"/>
-          <a:chExt cx="0" cy="0"/>
-        </a:xfrm>
-      </p:grpSpPr>
-      <p:sp>
-        <p:nvSpPr>
-          <p:cNvPr id="2" name="Title 1"/>
-          <p:cNvSpPr>
-            <a:spLocks noGrp="1"/>
-          </p:cNvSpPr>
-          <p:nvPr>
-            <p:ph type="title" idx="4294967295"/>
-          </p:nvPr>
-        </p:nvSpPr>
-        <p:spPr>
-          <a:xfrm>
-            <a:off x="666750" y="182563"/>
-            <a:ext cx="11525250" cy="1063625"/>
-          </a:xfrm>
-        </p:spPr>
-        <p:txBody>
-          <a:bodyPr/>
-          <a:lstStyle/>
-          <a:p>
-            <a:r>
-              <a:rPr lang="en-US" dirty="0" smtClean="0"/>
-              <a:t>Why use Express? </a:t>
-            </a:r>
-            <a:endParaRPr lang="en-US" dirty="0"/>
-          </a:p>
-        </p:txBody>
-      </p:sp>
-      <p:pic>
-        <p:nvPicPr>
-          <p:cNvPr id="1026" name="Picture 2" descr="BLOG POST - Part 2 - Screenshot 2"/>
-          <p:cNvPicPr>
-            <a:picLocks noChangeAspect="1" noChangeArrowheads="1"/>
-          </p:cNvPicPr>
-          <p:nvPr/>
-        </p:nvPicPr>
-        <p:blipFill>
-          <a:blip r:embed="rId2">
-            <a:extLst>
-              <a:ext uri="{28A0092B-C50C-407E-A947-70E740481C1C}">
-                <a14:useLocalDpi xmlns:a14="http://schemas.microsoft.com/office/drawing/2010/main" val="0"/>
-              </a:ext>
-            </a:extLst>
-          </a:blip>
-          <a:srcRect/>
-          <a:stretch>
-            <a:fillRect/>
-          </a:stretch>
-        </p:blipFill>
-        <p:spPr bwMode="auto">
-          <a:xfrm>
-            <a:off x="379514" y="1031705"/>
-            <a:ext cx="7667206" cy="5308066"/>
-          </a:xfrm>
-          <a:prstGeom prst="rect">
-            <a:avLst/>
-          </a:prstGeom>
-          <a:noFill/>
-          <a:ln>
-            <a:noFill/>
-          </a:ln>
-          <a:extLst>
-            <a:ext uri="{909E8E84-426E-40DD-AFC4-6F175D3DCCD1}">
-              <a14:hiddenFill xmlns:a14="http://schemas.microsoft.com/office/drawing/2010/main">
-                <a:solidFill>
-                  <a:srgbClr val="FFFFFF"/>
-                </a:solidFill>
-              </a14:hiddenFill>
-            </a:ext>
-            <a:ext uri="{91240B29-F687-4F45-9708-019B960494DF}">
-              <a14:hiddenLine xmlns:a14="http://schemas.microsoft.com/office/drawing/2010/main" w="9525">
-                <a:solidFill>
-                  <a:srgbClr val="000000"/>
-                </a:solidFill>
-                <a:miter lim="800000"/>
-                <a:headEnd/>
-                <a:tailEnd/>
-              </a14:hiddenLine>
-            </a:ext>
-          </a:extLst>
-        </p:spPr>
-      </p:pic>
-    </p:spTree>
-    <p:extLst>
-      <p:ext uri="{BB962C8B-B14F-4D97-AF65-F5344CB8AC3E}">
-        <p14:creationId xmlns:p14="http://schemas.microsoft.com/office/powerpoint/2010/main" val="1416731533"/>
-      </p:ext>
-    </p:extLst>
-  </p:cSld>
-  <p:clrMapOvr>
-    <a:masterClrMapping/>
-  </p:clrMapOvr>
-  <mc:AlternateContent xmlns:mc="http://schemas.openxmlformats.org/markup-compatibility/2006" xmlns:p14="http://schemas.microsoft.com/office/powerpoint/2010/main">
-    <mc:Choice Requires="p14">
-      <p:transition spd="med" p14:dur="700">
-        <p:fade/>
-      </p:transition>
-    </mc:Choice>
-    <mc:Fallback xmlns="">
-      <p:transition spd="med">
-        <p:fade/>
-      </p:transition>
-    </mc:Fallback>
-  </mc:AlternateContent>
-  <p:timing>
-    <p:tnLst>
-      <p:par>
-        <p:cTn id="1" dur="indefinite" restart="never" nodeType="tmRoot"/>
-      </p:par>
-    </p:tnLst>
-  </p:timing>
-</p:sld>
-</file>
-
-<file path=ppt/slides/slide14.xml><?xml version="1.0" encoding="utf-8"?>
-<p:sld xmlns:a="http://schemas.openxmlformats.org/drawingml/2006/main" xmlns:r="http://schemas.openxmlformats.org/officeDocument/2006/relationships" xmlns:p="http://schemas.openxmlformats.org/presentationml/2006/main" show="0">
-  <p:cSld>
-    <p:spTree>
-      <p:nvGrpSpPr>
-        <p:cNvPr id="1" name=""/>
-        <p:cNvGrpSpPr/>
-        <p:nvPr/>
-      </p:nvGrpSpPr>
-      <p:grpSpPr>
-        <a:xfrm>
-          <a:off x="0" y="0"/>
-          <a:ext cx="0" cy="0"/>
-          <a:chOff x="0" y="0"/>
-          <a:chExt cx="0" cy="0"/>
-        </a:xfrm>
-      </p:grpSpPr>
-      <p:sp>
-        <p:nvSpPr>
-          <p:cNvPr id="2" name="Title 1"/>
-          <p:cNvSpPr>
-            <a:spLocks noGrp="1"/>
-          </p:cNvSpPr>
-          <p:nvPr>
-            <p:ph type="title" idx="4294967295"/>
-          </p:nvPr>
-        </p:nvSpPr>
-        <p:spPr>
-          <a:xfrm>
-            <a:off x="666750" y="182563"/>
-            <a:ext cx="11525250" cy="1063625"/>
-          </a:xfrm>
-        </p:spPr>
-        <p:txBody>
-          <a:bodyPr/>
-          <a:lstStyle/>
-          <a:p>
-            <a:r>
-              <a:rPr lang="en-US" dirty="0" smtClean="0"/>
-              <a:t>Why use Express? </a:t>
-            </a:r>
-            <a:endParaRPr lang="en-US" dirty="0"/>
-          </a:p>
-        </p:txBody>
-      </p:sp>
-      <p:pic>
-        <p:nvPicPr>
-          <p:cNvPr id="2050" name="Picture 2" descr="BLOG POST - Part 2 - Screenshot 3"/>
-          <p:cNvPicPr>
-            <a:picLocks noChangeAspect="1" noChangeArrowheads="1"/>
-          </p:cNvPicPr>
-          <p:nvPr/>
-        </p:nvPicPr>
-        <p:blipFill>
-          <a:blip r:embed="rId2">
-            <a:extLst>
-              <a:ext uri="{28A0092B-C50C-407E-A947-70E740481C1C}">
-                <a14:useLocalDpi xmlns:a14="http://schemas.microsoft.com/office/drawing/2010/main" val="0"/>
-              </a:ext>
-            </a:extLst>
-          </a:blip>
-          <a:srcRect/>
-          <a:stretch>
-            <a:fillRect/>
-          </a:stretch>
-        </p:blipFill>
-        <p:spPr bwMode="auto">
-          <a:xfrm>
-            <a:off x="379514" y="1144245"/>
-            <a:ext cx="9671044" cy="5298757"/>
-          </a:xfrm>
-          <a:prstGeom prst="rect">
-            <a:avLst/>
-          </a:prstGeom>
-          <a:noFill/>
-          <a:ln>
-            <a:noFill/>
-          </a:ln>
-          <a:extLst>
-            <a:ext uri="{909E8E84-426E-40DD-AFC4-6F175D3DCCD1}">
-              <a14:hiddenFill xmlns:a14="http://schemas.microsoft.com/office/drawing/2010/main">
-                <a:solidFill>
-                  <a:srgbClr val="FFFFFF"/>
-                </a:solidFill>
-              </a14:hiddenFill>
-            </a:ext>
-            <a:ext uri="{91240B29-F687-4F45-9708-019B960494DF}">
-              <a14:hiddenLine xmlns:a14="http://schemas.microsoft.com/office/drawing/2010/main" w="9525">
-                <a:solidFill>
-                  <a:srgbClr val="000000"/>
-                </a:solidFill>
-                <a:miter lim="800000"/>
-                <a:headEnd/>
-                <a:tailEnd/>
-              </a14:hiddenLine>
-            </a:ext>
-          </a:extLst>
-        </p:spPr>
-      </p:pic>
-    </p:spTree>
-    <p:extLst>
-      <p:ext uri="{BB962C8B-B14F-4D97-AF65-F5344CB8AC3E}">
-        <p14:creationId xmlns:p14="http://schemas.microsoft.com/office/powerpoint/2010/main" val="2642491047"/>
-      </p:ext>
-    </p:extLst>
-  </p:cSld>
-  <p:clrMapOvr>
-    <a:masterClrMapping/>
-  </p:clrMapOvr>
-  <mc:AlternateContent xmlns:mc="http://schemas.openxmlformats.org/markup-compatibility/2006" xmlns:p14="http://schemas.microsoft.com/office/powerpoint/2010/main">
-    <mc:Choice Requires="p14">
-      <p:transition spd="med" p14:dur="700">
-        <p:fade/>
-      </p:transition>
-    </mc:Choice>
-    <mc:Fallback xmlns="">
-      <p:transition spd="med">
-        <p:fade/>
-      </p:transition>
-    </mc:Fallback>
-  </mc:AlternateContent>
-  <p:timing>
-    <p:tnLst>
-      <p:par>
-        <p:cTn id="1" dur="indefinite" restart="never" nodeType="tmRoot"/>
-      </p:par>
-    </p:tnLst>
-  </p:timing>
-</p:sld>
-</file>
-
-<file path=ppt/slides/slide15.xml><?xml version="1.0" encoding="utf-8"?>
-<p:sld xmlns:a="http://schemas.openxmlformats.org/drawingml/2006/main" xmlns:r="http://schemas.openxmlformats.org/officeDocument/2006/relationships" xmlns:p="http://schemas.openxmlformats.org/presentationml/2006/main" show="0">
-  <p:cSld>
-    <p:spTree>
-      <p:nvGrpSpPr>
-        <p:cNvPr id="1" name=""/>
-        <p:cNvGrpSpPr/>
-        <p:nvPr/>
-      </p:nvGrpSpPr>
-      <p:grpSpPr>
-        <a:xfrm>
-          <a:off x="0" y="0"/>
-          <a:ext cx="0" cy="0"/>
-          <a:chOff x="0" y="0"/>
-          <a:chExt cx="0" cy="0"/>
-        </a:xfrm>
-      </p:grpSpPr>
-      <p:sp>
-        <p:nvSpPr>
-          <p:cNvPr id="2" name="Title 1"/>
-          <p:cNvSpPr>
-            <a:spLocks noGrp="1"/>
-          </p:cNvSpPr>
-          <p:nvPr>
-            <p:ph type="title" idx="4294967295"/>
-          </p:nvPr>
-        </p:nvSpPr>
-        <p:spPr>
-          <a:xfrm>
-            <a:off x="666750" y="182563"/>
-            <a:ext cx="11525250" cy="1063625"/>
-          </a:xfrm>
-        </p:spPr>
-        <p:txBody>
-          <a:bodyPr/>
-          <a:lstStyle/>
-          <a:p>
-            <a:r>
-              <a:rPr lang="en-US" dirty="0" smtClean="0"/>
-              <a:t>Why use Express? </a:t>
-            </a:r>
-            <a:endParaRPr lang="en-US" dirty="0"/>
-          </a:p>
-        </p:txBody>
-      </p:sp>
-      <p:pic>
-        <p:nvPicPr>
-          <p:cNvPr id="3074" name="Picture 2" descr="BLOG POST - Part 2 - Screenshot 4"/>
-          <p:cNvPicPr>
-            <a:picLocks noChangeAspect="1" noChangeArrowheads="1"/>
-          </p:cNvPicPr>
-          <p:nvPr/>
-        </p:nvPicPr>
-        <p:blipFill>
-          <a:blip r:embed="rId2">
-            <a:extLst>
-              <a:ext uri="{28A0092B-C50C-407E-A947-70E740481C1C}">
-                <a14:useLocalDpi xmlns:a14="http://schemas.microsoft.com/office/drawing/2010/main" val="0"/>
-              </a:ext>
-            </a:extLst>
-          </a:blip>
-          <a:srcRect/>
-          <a:stretch>
-            <a:fillRect/>
-          </a:stretch>
-        </p:blipFill>
-        <p:spPr bwMode="auto">
-          <a:xfrm>
-            <a:off x="553403" y="989502"/>
-            <a:ext cx="8717206" cy="5769561"/>
-          </a:xfrm>
-          <a:prstGeom prst="rect">
-            <a:avLst/>
-          </a:prstGeom>
-          <a:noFill/>
-          <a:ln>
-            <a:noFill/>
-          </a:ln>
-          <a:extLst>
-            <a:ext uri="{909E8E84-426E-40DD-AFC4-6F175D3DCCD1}">
-              <a14:hiddenFill xmlns:a14="http://schemas.microsoft.com/office/drawing/2010/main">
-                <a:solidFill>
-                  <a:srgbClr val="FFFFFF"/>
-                </a:solidFill>
-              </a14:hiddenFill>
-            </a:ext>
-            <a:ext uri="{91240B29-F687-4F45-9708-019B960494DF}">
-              <a14:hiddenLine xmlns:a14="http://schemas.microsoft.com/office/drawing/2010/main" w="9525">
-                <a:solidFill>
-                  <a:srgbClr val="000000"/>
-                </a:solidFill>
-                <a:miter lim="800000"/>
-                <a:headEnd/>
-                <a:tailEnd/>
-              </a14:hiddenLine>
-            </a:ext>
-          </a:extLst>
-        </p:spPr>
-      </p:pic>
-    </p:spTree>
-    <p:extLst>
-      <p:ext uri="{BB962C8B-B14F-4D97-AF65-F5344CB8AC3E}">
-        <p14:creationId xmlns:p14="http://schemas.microsoft.com/office/powerpoint/2010/main" val="2211259834"/>
-      </p:ext>
-    </p:extLst>
-  </p:cSld>
-  <p:clrMapOvr>
-    <a:masterClrMapping/>
-  </p:clrMapOvr>
-  <mc:AlternateContent xmlns:mc="http://schemas.openxmlformats.org/markup-compatibility/2006" xmlns:p14="http://schemas.microsoft.com/office/powerpoint/2010/main">
-    <mc:Choice Requires="p14">
-      <p:transition spd="med" p14:dur="700">
-        <p:fade/>
-      </p:transition>
-    </mc:Choice>
-    <mc:Fallback xmlns="">
-      <p:transition spd="med">
-        <p:fade/>
-      </p:transition>
-    </mc:Fallback>
-  </mc:AlternateContent>
-  <p:timing>
-    <p:tnLst>
-      <p:par>
-        <p:cTn id="1" dur="indefinite" restart="never" nodeType="tmRoot"/>
-      </p:par>
-    </p:tnLst>
-  </p:timing>
-</p:sld>
-</file>
-
-<file path=ppt/slides/slide16.xml><?xml version="1.0" encoding="utf-8"?>
-<p:sld xmlns:a="http://schemas.openxmlformats.org/drawingml/2006/main" xmlns:r="http://schemas.openxmlformats.org/officeDocument/2006/relationships" xmlns:p="http://schemas.openxmlformats.org/presentationml/2006/main" show="0">
-  <p:cSld>
-    <p:spTree>
-      <p:nvGrpSpPr>
-        <p:cNvPr id="1" name=""/>
-        <p:cNvGrpSpPr/>
-        <p:nvPr/>
-      </p:nvGrpSpPr>
-      <p:grpSpPr>
-        <a:xfrm>
-          <a:off x="0" y="0"/>
-          <a:ext cx="0" cy="0"/>
-          <a:chOff x="0" y="0"/>
-          <a:chExt cx="0" cy="0"/>
-        </a:xfrm>
-      </p:grpSpPr>
-      <p:sp>
-        <p:nvSpPr>
-          <p:cNvPr id="2" name="Title 1"/>
-          <p:cNvSpPr>
-            <a:spLocks noGrp="1"/>
-          </p:cNvSpPr>
-          <p:nvPr>
-            <p:ph type="title" idx="4294967295"/>
-          </p:nvPr>
-        </p:nvSpPr>
-        <p:spPr>
-          <a:xfrm>
-            <a:off x="666750" y="182563"/>
-            <a:ext cx="11525250" cy="1063625"/>
-          </a:xfrm>
-        </p:spPr>
-        <p:txBody>
-          <a:bodyPr/>
-          <a:lstStyle/>
-          <a:p>
-            <a:r>
-              <a:rPr lang="en-US" dirty="0" smtClean="0"/>
-              <a:t>Why use Express? </a:t>
-            </a:r>
-            <a:endParaRPr lang="en-US" dirty="0"/>
-          </a:p>
-        </p:txBody>
-      </p:sp>
-      <p:pic>
-        <p:nvPicPr>
-          <p:cNvPr id="5" name="Picture 4" descr="C:\Users\Rami\AppData\Local\Microsoft\Windows\INetCache\Content.Word\BLOG POST - Part 2 - Screenshot 7.png"/>
-          <p:cNvPicPr/>
-          <p:nvPr/>
-        </p:nvPicPr>
-        <p:blipFill>
-          <a:blip r:embed="rId2">
-            <a:extLst>
-              <a:ext uri="{28A0092B-C50C-407E-A947-70E740481C1C}">
-                <a14:useLocalDpi xmlns:a14="http://schemas.microsoft.com/office/drawing/2010/main" val="0"/>
-              </a:ext>
-            </a:extLst>
-          </a:blip>
-          <a:srcRect/>
-          <a:stretch>
-            <a:fillRect/>
-          </a:stretch>
-        </p:blipFill>
-        <p:spPr bwMode="auto">
-          <a:xfrm>
-            <a:off x="379514" y="1245702"/>
-            <a:ext cx="10775281" cy="4254766"/>
-          </a:xfrm>
-          <a:prstGeom prst="rect">
-            <a:avLst/>
-          </a:prstGeom>
-          <a:noFill/>
-          <a:ln>
-            <a:noFill/>
-          </a:ln>
-        </p:spPr>
-      </p:pic>
-    </p:spTree>
-    <p:extLst>
-      <p:ext uri="{BB962C8B-B14F-4D97-AF65-F5344CB8AC3E}">
-        <p14:creationId xmlns:p14="http://schemas.microsoft.com/office/powerpoint/2010/main" val="3052309441"/>
-      </p:ext>
-    </p:extLst>
-  </p:cSld>
-  <p:clrMapOvr>
-    <a:masterClrMapping/>
-  </p:clrMapOvr>
-  <mc:AlternateContent xmlns:mc="http://schemas.openxmlformats.org/markup-compatibility/2006" xmlns:p14="http://schemas.microsoft.com/office/powerpoint/2010/main">
-    <mc:Choice Requires="p14">
-      <p:transition spd="med" p14:dur="700">
-        <p:fade/>
-      </p:transition>
-    </mc:Choice>
-    <mc:Fallback xmlns="">
-      <p:transition spd="med">
-        <p:fade/>
-      </p:transition>
-    </mc:Fallback>
-  </mc:AlternateContent>
-  <p:timing>
-    <p:tnLst>
-      <p:par>
-        <p:cTn id="1" dur="indefinite" restart="never" nodeType="tmRoot"/>
-      </p:par>
-    </p:tnLst>
-  </p:timing>
-</p:sld>
-</file>
-
-<file path=ppt/slides/slide17.xml><?xml version="1.0" encoding="utf-8"?>
-<p:sld xmlns:a="http://schemas.openxmlformats.org/drawingml/2006/main" xmlns:r="http://schemas.openxmlformats.org/officeDocument/2006/relationships" xmlns:p="http://schemas.openxmlformats.org/presentationml/2006/main" show="0">
-  <p:cSld>
-    <p:spTree>
-      <p:nvGrpSpPr>
-        <p:cNvPr id="1" name=""/>
-        <p:cNvGrpSpPr/>
-        <p:nvPr/>
-      </p:nvGrpSpPr>
-      <p:grpSpPr>
-        <a:xfrm>
-          <a:off x="0" y="0"/>
-          <a:ext cx="0" cy="0"/>
-          <a:chOff x="0" y="0"/>
-          <a:chExt cx="0" cy="0"/>
-        </a:xfrm>
-      </p:grpSpPr>
-      <p:sp>
-        <p:nvSpPr>
-          <p:cNvPr id="2" name="Title 1"/>
-          <p:cNvSpPr>
-            <a:spLocks noGrp="1"/>
-          </p:cNvSpPr>
-          <p:nvPr>
-            <p:ph type="title" idx="4294967295"/>
-          </p:nvPr>
-        </p:nvSpPr>
-        <p:spPr>
-          <a:xfrm>
-            <a:off x="666750" y="182563"/>
-            <a:ext cx="11525250" cy="1063625"/>
-          </a:xfrm>
-        </p:spPr>
-        <p:txBody>
-          <a:bodyPr/>
-          <a:lstStyle/>
-          <a:p>
-            <a:r>
-              <a:rPr lang="en-US" dirty="0" smtClean="0"/>
-              <a:t>Why use Express? </a:t>
-            </a:r>
-            <a:endParaRPr lang="en-US" dirty="0"/>
-          </a:p>
-        </p:txBody>
-      </p:sp>
-      <p:pic>
-        <p:nvPicPr>
-          <p:cNvPr id="9218" name="Picture 2" descr="BLOG POST - Part 2 - Screenshot 8"/>
-          <p:cNvPicPr>
-            <a:picLocks noChangeAspect="1" noChangeArrowheads="1"/>
-          </p:cNvPicPr>
-          <p:nvPr/>
-        </p:nvPicPr>
-        <p:blipFill>
-          <a:blip r:embed="rId2">
-            <a:extLst>
-              <a:ext uri="{28A0092B-C50C-407E-A947-70E740481C1C}">
-                <a14:useLocalDpi xmlns:a14="http://schemas.microsoft.com/office/drawing/2010/main" val="0"/>
-              </a:ext>
-            </a:extLst>
-          </a:blip>
-          <a:srcRect/>
-          <a:stretch>
-            <a:fillRect/>
-          </a:stretch>
-        </p:blipFill>
-        <p:spPr bwMode="auto">
-          <a:xfrm>
-            <a:off x="379514" y="1045772"/>
-            <a:ext cx="10227526" cy="5195714"/>
-          </a:xfrm>
-          <a:prstGeom prst="rect">
-            <a:avLst/>
-          </a:prstGeom>
-          <a:noFill/>
-          <a:ln>
-            <a:noFill/>
-          </a:ln>
-          <a:extLst>
-            <a:ext uri="{909E8E84-426E-40DD-AFC4-6F175D3DCCD1}">
-              <a14:hiddenFill xmlns:a14="http://schemas.microsoft.com/office/drawing/2010/main">
-                <a:solidFill>
-                  <a:srgbClr val="FFFFFF"/>
-                </a:solidFill>
-              </a14:hiddenFill>
-            </a:ext>
-            <a:ext uri="{91240B29-F687-4F45-9708-019B960494DF}">
-              <a14:hiddenLine xmlns:a14="http://schemas.microsoft.com/office/drawing/2010/main" w="9525">
-                <a:solidFill>
-                  <a:srgbClr val="000000"/>
-                </a:solidFill>
-                <a:miter lim="800000"/>
-                <a:headEnd/>
-                <a:tailEnd/>
-              </a14:hiddenLine>
-            </a:ext>
-          </a:extLst>
-        </p:spPr>
-      </p:pic>
-    </p:spTree>
-    <p:extLst>
-      <p:ext uri="{BB962C8B-B14F-4D97-AF65-F5344CB8AC3E}">
-        <p14:creationId xmlns:p14="http://schemas.microsoft.com/office/powerpoint/2010/main" val="807860383"/>
-      </p:ext>
-    </p:extLst>
-  </p:cSld>
-  <p:clrMapOvr>
-    <a:masterClrMapping/>
-  </p:clrMapOvr>
-  <mc:AlternateContent xmlns:mc="http://schemas.openxmlformats.org/markup-compatibility/2006" xmlns:p14="http://schemas.microsoft.com/office/powerpoint/2010/main">
-    <mc:Choice Requires="p14">
-      <p:transition spd="med" p14:dur="700">
-        <p:fade/>
-      </p:transition>
-    </mc:Choice>
-    <mc:Fallback xmlns="">
-      <p:transition spd="med">
-        <p:fade/>
-      </p:transition>
-    </mc:Fallback>
-  </mc:AlternateContent>
-  <p:timing>
-    <p:tnLst>
-      <p:par>
-        <p:cTn id="1" dur="indefinite" restart="never" nodeType="tmRoot"/>
-      </p:par>
-    </p:tnLst>
-  </p:timing>
-</p:sld>
-</file>
-
-<file path=ppt/slides/slide18.xml><?xml version="1.0" encoding="utf-8"?>
-<p:sld xmlns:a="http://schemas.openxmlformats.org/drawingml/2006/main" xmlns:r="http://schemas.openxmlformats.org/officeDocument/2006/relationships" xmlns:p="http://schemas.openxmlformats.org/presentationml/2006/main" show="0">
-  <p:cSld>
-    <p:spTree>
-      <p:nvGrpSpPr>
-        <p:cNvPr id="1" name=""/>
-        <p:cNvGrpSpPr/>
-        <p:nvPr/>
-      </p:nvGrpSpPr>
-      <p:grpSpPr>
-        <a:xfrm>
-          <a:off x="0" y="0"/>
-          <a:ext cx="0" cy="0"/>
-          <a:chOff x="0" y="0"/>
-          <a:chExt cx="0" cy="0"/>
-        </a:xfrm>
-      </p:grpSpPr>
-      <p:sp>
-        <p:nvSpPr>
-          <p:cNvPr id="2" name="Title 1"/>
-          <p:cNvSpPr>
-            <a:spLocks noGrp="1"/>
-          </p:cNvSpPr>
-          <p:nvPr>
-            <p:ph type="title" idx="4294967295"/>
-          </p:nvPr>
-        </p:nvSpPr>
-        <p:spPr>
-          <a:xfrm>
-            <a:off x="666750" y="182563"/>
-            <a:ext cx="11525250" cy="1063625"/>
-          </a:xfrm>
-        </p:spPr>
-        <p:txBody>
-          <a:bodyPr/>
-          <a:lstStyle/>
-          <a:p>
-            <a:r>
-              <a:rPr lang="en-US" dirty="0" smtClean="0"/>
-              <a:t>Why use Express? </a:t>
-            </a:r>
-            <a:endParaRPr lang="en-US" dirty="0"/>
-          </a:p>
-        </p:txBody>
-      </p:sp>
-      <p:pic>
-        <p:nvPicPr>
-          <p:cNvPr id="10242" name="Picture 2" descr="BLOG POST - Part 2 - Screenshot 9"/>
-          <p:cNvPicPr>
-            <a:picLocks noChangeAspect="1" noChangeArrowheads="1"/>
-          </p:cNvPicPr>
-          <p:nvPr/>
-        </p:nvPicPr>
-        <p:blipFill>
-          <a:blip r:embed="rId2">
-            <a:extLst>
-              <a:ext uri="{28A0092B-C50C-407E-A947-70E740481C1C}">
-                <a14:useLocalDpi xmlns:a14="http://schemas.microsoft.com/office/drawing/2010/main" val="0"/>
-              </a:ext>
-            </a:extLst>
-          </a:blip>
-          <a:srcRect/>
-          <a:stretch>
-            <a:fillRect/>
-          </a:stretch>
-        </p:blipFill>
-        <p:spPr bwMode="auto">
-          <a:xfrm>
-            <a:off x="379513" y="1017636"/>
-            <a:ext cx="10245389" cy="5664518"/>
-          </a:xfrm>
-          <a:prstGeom prst="rect">
-            <a:avLst/>
-          </a:prstGeom>
-          <a:noFill/>
-          <a:ln>
-            <a:noFill/>
-          </a:ln>
-          <a:extLst>
-            <a:ext uri="{909E8E84-426E-40DD-AFC4-6F175D3DCCD1}">
-              <a14:hiddenFill xmlns:a14="http://schemas.microsoft.com/office/drawing/2010/main">
-                <a:solidFill>
-                  <a:srgbClr val="FFFFFF"/>
-                </a:solidFill>
-              </a14:hiddenFill>
-            </a:ext>
-            <a:ext uri="{91240B29-F687-4F45-9708-019B960494DF}">
-              <a14:hiddenLine xmlns:a14="http://schemas.microsoft.com/office/drawing/2010/main" w="9525">
-                <a:solidFill>
-                  <a:srgbClr val="000000"/>
-                </a:solidFill>
-                <a:miter lim="800000"/>
-                <a:headEnd/>
-                <a:tailEnd/>
-              </a14:hiddenLine>
-            </a:ext>
-          </a:extLst>
-        </p:spPr>
-      </p:pic>
-    </p:spTree>
-    <p:extLst>
-      <p:ext uri="{BB962C8B-B14F-4D97-AF65-F5344CB8AC3E}">
-        <p14:creationId xmlns:p14="http://schemas.microsoft.com/office/powerpoint/2010/main" val="2360006945"/>
-      </p:ext>
-    </p:extLst>
-  </p:cSld>
-  <p:clrMapOvr>
-    <a:masterClrMapping/>
-  </p:clrMapOvr>
-  <mc:AlternateContent xmlns:mc="http://schemas.openxmlformats.org/markup-compatibility/2006" xmlns:p14="http://schemas.microsoft.com/office/powerpoint/2010/main">
-    <mc:Choice Requires="p14">
-      <p:transition spd="med" p14:dur="700">
-        <p:fade/>
-      </p:transition>
-    </mc:Choice>
-    <mc:Fallback xmlns="">
-      <p:transition spd="med">
-        <p:fade/>
-      </p:transition>
-    </mc:Fallback>
-  </mc:AlternateContent>
-  <p:timing>
-    <p:tnLst>
-      <p:par>
-        <p:cTn id="1" dur="indefinite" restart="never" nodeType="tmRoot"/>
-      </p:par>
-    </p:tnLst>
-  </p:timing>
-</p:sld>
-</file>
-
-<file path=ppt/slides/slide19.xml><?xml version="1.0" encoding="utf-8"?>
 <p:sld xmlns:a="http://schemas.openxmlformats.org/drawingml/2006/main" xmlns:r="http://schemas.openxmlformats.org/officeDocument/2006/relationships" xmlns:p="http://schemas.openxmlformats.org/presentationml/2006/main">
   <p:cSld>
     <p:spTree>
@@ -18682,6 +17805,55 @@
     <p:extLst>
       <p:ext uri="{BB962C8B-B14F-4D97-AF65-F5344CB8AC3E}">
         <p14:creationId xmlns:p14="http://schemas.microsoft.com/office/powerpoint/2010/main" val="1902419148"/>
+      </p:ext>
+    </p:extLst>
+  </p:cSld>
+  <p:clrMapOvr>
+    <a:masterClrMapping/>
+  </p:clrMapOvr>
+  <mc:AlternateContent xmlns:mc="http://schemas.openxmlformats.org/markup-compatibility/2006" xmlns:p14="http://schemas.microsoft.com/office/powerpoint/2010/main">
+    <mc:Choice Requires="p14">
+      <p:transition spd="med" p14:dur="700">
+        <p:fade/>
+      </p:transition>
+    </mc:Choice>
+    <mc:Fallback xmlns="">
+      <p:transition spd="med">
+        <p:fade/>
+      </p:transition>
+    </mc:Fallback>
+  </mc:AlternateContent>
+  <p:timing>
+    <p:tnLst>
+      <p:par>
+        <p:cTn id="1" dur="indefinite" restart="never" nodeType="tmRoot"/>
+      </p:par>
+    </p:tnLst>
+  </p:timing>
+</p:sld>
+</file>
+
+<file path=ppt/slides/slide13.xml><?xml version="1.0" encoding="utf-8"?>
+<p:sld xmlns:a="http://schemas.openxmlformats.org/drawingml/2006/main" xmlns:r="http://schemas.openxmlformats.org/officeDocument/2006/relationships" xmlns:p="http://schemas.openxmlformats.org/presentationml/2006/main">
+  <p:cSld>
+    <p:spTree>
+      <p:nvGrpSpPr>
+        <p:cNvPr id="1" name=""/>
+        <p:cNvGrpSpPr/>
+        <p:nvPr/>
+      </p:nvGrpSpPr>
+      <p:grpSpPr>
+        <a:xfrm>
+          <a:off x="0" y="0"/>
+          <a:ext cx="0" cy="0"/>
+          <a:chOff x="0" y="0"/>
+          <a:chExt cx="0" cy="0"/>
+        </a:xfrm>
+      </p:grpSpPr>
+    </p:spTree>
+    <p:extLst>
+      <p:ext uri="{BB962C8B-B14F-4D97-AF65-F5344CB8AC3E}">
+        <p14:creationId xmlns:p14="http://schemas.microsoft.com/office/powerpoint/2010/main" val="898363405"/>
       </p:ext>
     </p:extLst>
   </p:cSld>
@@ -18831,55 +18003,6 @@
     <p:extLst>
       <p:ext uri="{BB962C8B-B14F-4D97-AF65-F5344CB8AC3E}">
         <p14:creationId xmlns:p14="http://schemas.microsoft.com/office/powerpoint/2010/main" val="2864860981"/>
-      </p:ext>
-    </p:extLst>
-  </p:cSld>
-  <p:clrMapOvr>
-    <a:masterClrMapping/>
-  </p:clrMapOvr>
-  <mc:AlternateContent xmlns:mc="http://schemas.openxmlformats.org/markup-compatibility/2006" xmlns:p14="http://schemas.microsoft.com/office/powerpoint/2010/main">
-    <mc:Choice Requires="p14">
-      <p:transition spd="med" p14:dur="700">
-        <p:fade/>
-      </p:transition>
-    </mc:Choice>
-    <mc:Fallback xmlns="">
-      <p:transition spd="med">
-        <p:fade/>
-      </p:transition>
-    </mc:Fallback>
-  </mc:AlternateContent>
-  <p:timing>
-    <p:tnLst>
-      <p:par>
-        <p:cTn id="1" dur="indefinite" restart="never" nodeType="tmRoot"/>
-      </p:par>
-    </p:tnLst>
-  </p:timing>
-</p:sld>
-</file>
-
-<file path=ppt/slides/slide20.xml><?xml version="1.0" encoding="utf-8"?>
-<p:sld xmlns:a="http://schemas.openxmlformats.org/drawingml/2006/main" xmlns:r="http://schemas.openxmlformats.org/officeDocument/2006/relationships" xmlns:p="http://schemas.openxmlformats.org/presentationml/2006/main">
-  <p:cSld>
-    <p:spTree>
-      <p:nvGrpSpPr>
-        <p:cNvPr id="1" name=""/>
-        <p:cNvGrpSpPr/>
-        <p:nvPr/>
-      </p:nvGrpSpPr>
-      <p:grpSpPr>
-        <a:xfrm>
-          <a:off x="0" y="0"/>
-          <a:ext cx="0" cy="0"/>
-          <a:chOff x="0" y="0"/>
-          <a:chExt cx="0" cy="0"/>
-        </a:xfrm>
-      </p:grpSpPr>
-    </p:spTree>
-    <p:extLst>
-      <p:ext uri="{BB962C8B-B14F-4D97-AF65-F5344CB8AC3E}">
-        <p14:creationId xmlns:p14="http://schemas.microsoft.com/office/powerpoint/2010/main" val="898363405"/>
       </p:ext>
     </p:extLst>
   </p:cSld>
@@ -19593,8 +18716,8 @@
         </p:nvSpPr>
         <p:spPr>
           <a:xfrm>
-            <a:off x="560798" y="5045529"/>
-            <a:ext cx="10183402" cy="816429"/>
+            <a:off x="560798" y="5477691"/>
+            <a:ext cx="7294333" cy="614884"/>
           </a:xfrm>
           <a:prstGeom prst="rect">
             <a:avLst/>
@@ -19659,7 +18782,7 @@
         <p:spPr/>
         <p:txBody>
           <a:bodyPr>
-            <a:normAutofit fontScale="92500" lnSpcReduction="10000"/>
+            <a:normAutofit fontScale="92500"/>
           </a:bodyPr>
           <a:lstStyle/>
           <a:p>
@@ -19728,7 +18851,7 @@
               <a:buNone/>
             </a:pPr>
             <a:r>
-              <a:rPr lang="en-US" altLang="en-US" dirty="0" err="1" smtClean="0">
+              <a:rPr lang="en-US" altLang="en-US" sz="2600" dirty="0" err="1" smtClean="0">
                 <a:solidFill>
                   <a:srgbClr val="000000"/>
                 </a:solidFill>
@@ -19738,7 +18861,7 @@
               <a:t>app.</a:t>
             </a:r>
             <a:r>
-              <a:rPr lang="en-US" altLang="en-US" dirty="0" err="1" smtClean="0">
+              <a:rPr lang="en-US" altLang="en-US" sz="2600" dirty="0" err="1" smtClean="0">
                 <a:solidFill>
                   <a:srgbClr val="0000FF"/>
                 </a:solidFill>
@@ -19748,7 +18871,7 @@
               <a:t>get</a:t>
             </a:r>
             <a:r>
-              <a:rPr lang="en-US" altLang="en-US" dirty="0" smtClean="0">
+              <a:rPr lang="en-US" altLang="en-US" sz="2600" dirty="0" smtClean="0">
                 <a:solidFill>
                   <a:srgbClr val="000000"/>
                 </a:solidFill>
@@ -19758,7 +18881,7 @@
               <a:t>(</a:t>
             </a:r>
             <a:r>
-              <a:rPr lang="en-US" altLang="en-US" dirty="0" smtClean="0">
+              <a:rPr lang="en-US" altLang="en-US" sz="2600" dirty="0" smtClean="0">
                 <a:solidFill>
                   <a:srgbClr val="A31515"/>
                 </a:solidFill>
@@ -19768,7 +18891,7 @@
               <a:t>'/index'</a:t>
             </a:r>
             <a:r>
-              <a:rPr lang="en-US" altLang="en-US" dirty="0" smtClean="0">
+              <a:rPr lang="en-US" altLang="en-US" sz="2600" dirty="0" smtClean="0">
                 <a:solidFill>
                   <a:srgbClr val="000000"/>
                 </a:solidFill>
@@ -19778,7 +18901,7 @@
               <a:t>,</a:t>
             </a:r>
             <a:r>
-              <a:rPr lang="en-US" altLang="en-US" dirty="0">
+              <a:rPr lang="en-US" altLang="en-US" sz="2600" dirty="0">
                 <a:solidFill>
                   <a:srgbClr val="000000"/>
                 </a:solidFill>
@@ -19788,7 +18911,7 @@
               <a:t> </a:t>
             </a:r>
             <a:r>
-              <a:rPr lang="en-US" altLang="en-US" dirty="0">
+              <a:rPr lang="en-US" altLang="en-US" sz="2600" dirty="0">
                 <a:solidFill>
                   <a:srgbClr val="0000FF"/>
                 </a:solidFill>
@@ -19798,7 +18921,7 @@
               <a:t>function</a:t>
             </a:r>
             <a:r>
-              <a:rPr lang="en-US" altLang="en-US" dirty="0">
+              <a:rPr lang="en-US" altLang="en-US" sz="2600" dirty="0">
                 <a:solidFill>
                   <a:srgbClr val="000000"/>
                 </a:solidFill>
@@ -19808,7 +18931,7 @@
               <a:t> (</a:t>
             </a:r>
             <a:r>
-              <a:rPr lang="en-US" altLang="en-US" dirty="0" err="1">
+              <a:rPr lang="en-US" altLang="en-US" sz="2600" dirty="0" err="1">
                 <a:solidFill>
                   <a:srgbClr val="000000"/>
                 </a:solidFill>
@@ -19818,7 +18941,7 @@
               <a:t>req</a:t>
             </a:r>
             <a:r>
-              <a:rPr lang="en-US" altLang="en-US" dirty="0">
+              <a:rPr lang="en-US" altLang="en-US" sz="2600" dirty="0">
                 <a:solidFill>
                   <a:srgbClr val="000000"/>
                 </a:solidFill>
@@ -19828,7 +18951,7 @@
               <a:t>, res) </a:t>
             </a:r>
             <a:r>
-              <a:rPr lang="en-US" altLang="en-US" dirty="0" smtClean="0">
+              <a:rPr lang="en-US" altLang="en-US" sz="2600" dirty="0" smtClean="0">
                 <a:solidFill>
                   <a:srgbClr val="000000"/>
                 </a:solidFill>
@@ -21902,6 +21025,21 @@
 </file>
 
 <file path=customXml/item1.xml><?xml version="1.0" encoding="utf-8"?>
+<?mso-contentType ?>
+<FormTemplates xmlns="http://schemas.microsoft.com/sharepoint/v3/contenttype/forms">
+  <Display>DocumentLibraryForm</Display>
+  <Edit>DocumentLibraryForm</Edit>
+  <New>DocumentLibraryForm</New>
+</FormTemplates>
+</file>
+
+<file path=customXml/item2.xml><?xml version="1.0" encoding="utf-8"?>
+<p:properties xmlns:p="http://schemas.microsoft.com/office/2006/metadata/properties" xmlns:xsi="http://www.w3.org/2001/XMLSchema-instance" xmlns:pc="http://schemas.microsoft.com/office/infopath/2007/PartnerControls">
+  <documentManagement/>
+</p:properties>
+</file>
+
+<file path=customXml/item3.xml><?xml version="1.0" encoding="utf-8"?>
 <ct:contentTypeSchema xmlns:ct="http://schemas.microsoft.com/office/2006/metadata/contentType" xmlns:ma="http://schemas.microsoft.com/office/2006/metadata/properties/metaAttributes" ct:_="" ma:_="" ma:contentTypeName="Document" ma:contentTypeID="0x010100391E57C78B9F604FB8BAD296D1460E2A" ma:contentTypeVersion="1" ma:contentTypeDescription="Create a new document." ma:contentTypeScope="" ma:versionID="fb382fe2362acd2155f454904f478e4d">
   <xsd:schema xmlns:xsd="http://www.w3.org/2001/XMLSchema" xmlns:xs="http://www.w3.org/2001/XMLSchema" xmlns:p="http://schemas.microsoft.com/office/2006/metadata/properties" xmlns:ns3="636b0322-90fb-440c-9cbc-22749e7231e9" targetNamespace="http://schemas.microsoft.com/office/2006/metadata/properties" ma:root="true" ma:fieldsID="b9887c63ce4710c1aeb75a5f03aecb69" ns3:_="">
     <xsd:import namespace="636b0322-90fb-440c-9cbc-22749e7231e9"/>
@@ -22041,35 +21179,10 @@
 </ct:contentTypeSchema>
 </file>
 
-<file path=customXml/item2.xml><?xml version="1.0" encoding="utf-8"?>
-<p:properties xmlns:p="http://schemas.microsoft.com/office/2006/metadata/properties" xmlns:xsi="http://www.w3.org/2001/XMLSchema-instance" xmlns:pc="http://schemas.microsoft.com/office/infopath/2007/PartnerControls">
-  <documentManagement/>
-</p:properties>
-</file>
-
-<file path=customXml/item3.xml><?xml version="1.0" encoding="utf-8"?>
-<?mso-contentType ?>
-<FormTemplates xmlns="http://schemas.microsoft.com/sharepoint/v3/contenttype/forms">
-  <Display>DocumentLibraryForm</Display>
-  <Edit>DocumentLibraryForm</Edit>
-  <New>DocumentLibraryForm</New>
-</FormTemplates>
-</file>
-
 <file path=customXml/itemProps1.xml><?xml version="1.0" encoding="utf-8"?>
-<ds:datastoreItem xmlns:ds="http://schemas.openxmlformats.org/officeDocument/2006/customXml" ds:itemID="{7B70CE0C-0988-423A-BF66-B40F6A1061FF}">
+<ds:datastoreItem xmlns:ds="http://schemas.openxmlformats.org/officeDocument/2006/customXml" ds:itemID="{B0CA13EC-1D3C-4D6F-8D1C-E8A452CFC79A}">
   <ds:schemaRefs>
-    <ds:schemaRef ds:uri="http://schemas.microsoft.com/office/2006/metadata/contentType"/>
-    <ds:schemaRef ds:uri="http://schemas.microsoft.com/office/2006/metadata/properties/metaAttributes"/>
-    <ds:schemaRef ds:uri="http://www.w3.org/2001/XMLSchema"/>
-    <ds:schemaRef ds:uri="http://schemas.microsoft.com/office/2006/metadata/properties"/>
-    <ds:schemaRef ds:uri="636b0322-90fb-440c-9cbc-22749e7231e9"/>
-    <ds:schemaRef ds:uri="http://schemas.microsoft.com/office/2006/documentManagement/types"/>
-    <ds:schemaRef ds:uri="http://schemas.microsoft.com/office/infopath/2007/PartnerControls"/>
-    <ds:schemaRef ds:uri="http://schemas.openxmlformats.org/package/2006/metadata/core-properties"/>
-    <ds:schemaRef ds:uri="http://purl.org/dc/elements/1.1/"/>
-    <ds:schemaRef ds:uri="http://purl.org/dc/terms/"/>
-    <ds:schemaRef ds:uri="http://schemas.microsoft.com/internal/obd"/>
+    <ds:schemaRef ds:uri="http://schemas.microsoft.com/sharepoint/v3/contenttype/forms"/>
   </ds:schemaRefs>
 </ds:datastoreItem>
 </file>
@@ -22091,9 +21204,19 @@
 </file>
 
 <file path=customXml/itemProps3.xml><?xml version="1.0" encoding="utf-8"?>
-<ds:datastoreItem xmlns:ds="http://schemas.openxmlformats.org/officeDocument/2006/customXml" ds:itemID="{B0CA13EC-1D3C-4D6F-8D1C-E8A452CFC79A}">
+<ds:datastoreItem xmlns:ds="http://schemas.openxmlformats.org/officeDocument/2006/customXml" ds:itemID="{7B70CE0C-0988-423A-BF66-B40F6A1061FF}">
   <ds:schemaRefs>
-    <ds:schemaRef ds:uri="http://schemas.microsoft.com/sharepoint/v3/contenttype/forms"/>
+    <ds:schemaRef ds:uri="http://schemas.microsoft.com/office/2006/metadata/contentType"/>
+    <ds:schemaRef ds:uri="http://schemas.microsoft.com/office/2006/metadata/properties/metaAttributes"/>
+    <ds:schemaRef ds:uri="http://www.w3.org/2001/XMLSchema"/>
+    <ds:schemaRef ds:uri="http://schemas.microsoft.com/office/2006/metadata/properties"/>
+    <ds:schemaRef ds:uri="636b0322-90fb-440c-9cbc-22749e7231e9"/>
+    <ds:schemaRef ds:uri="http://schemas.microsoft.com/office/2006/documentManagement/types"/>
+    <ds:schemaRef ds:uri="http://schemas.microsoft.com/office/infopath/2007/PartnerControls"/>
+    <ds:schemaRef ds:uri="http://schemas.openxmlformats.org/package/2006/metadata/core-properties"/>
+    <ds:schemaRef ds:uri="http://purl.org/dc/elements/1.1/"/>
+    <ds:schemaRef ds:uri="http://purl.org/dc/terms/"/>
+    <ds:schemaRef ds:uri="http://schemas.microsoft.com/internal/obd"/>
   </ds:schemaRefs>
 </ds:datastoreItem>
 </file>
</xml_diff>

<commit_message>
Update steps and add new slides for IntroToNode and IntroToExpress demos and presentations.
</commit_message>
<xml_diff>
--- a/Presentation/IntroToExpress/IntroToExpress.pptx
+++ b/Presentation/IntroToExpress/IntroToExpress.pptx
@@ -11,10 +11,10 @@
     <p:sldMasterId id="2147483729" r:id="rId10"/>
   </p:sldMasterIdLst>
   <p:notesMasterIdLst>
-    <p:notesMasterId r:id="rId24"/>
+    <p:notesMasterId r:id="rId26"/>
   </p:notesMasterIdLst>
   <p:handoutMasterIdLst>
-    <p:handoutMasterId r:id="rId25"/>
+    <p:handoutMasterId r:id="rId27"/>
   </p:handoutMasterIdLst>
   <p:sldIdLst>
     <p:sldId id="297" r:id="rId11"/>
@@ -24,12 +24,14 @@
     <p:sldId id="287" r:id="rId15"/>
     <p:sldId id="301" r:id="rId16"/>
     <p:sldId id="295" r:id="rId17"/>
-    <p:sldId id="303" r:id="rId18"/>
-    <p:sldId id="296" r:id="rId19"/>
-    <p:sldId id="286" r:id="rId20"/>
-    <p:sldId id="302" r:id="rId21"/>
-    <p:sldId id="283" r:id="rId22"/>
-    <p:sldId id="269" r:id="rId23"/>
+    <p:sldId id="305" r:id="rId18"/>
+    <p:sldId id="303" r:id="rId19"/>
+    <p:sldId id="307" r:id="rId20"/>
+    <p:sldId id="296" r:id="rId21"/>
+    <p:sldId id="286" r:id="rId22"/>
+    <p:sldId id="302" r:id="rId23"/>
+    <p:sldId id="283" r:id="rId24"/>
+    <p:sldId id="269" r:id="rId25"/>
   </p:sldIdLst>
   <p:sldSz cx="12192000" cy="6858000"/>
   <p:notesSz cx="6858000" cy="9144000"/>
@@ -221,7 +223,7 @@
           <a:p>
             <a:fld id="{312E7B4A-039C-48A2-9B2C-AF16AA3873D8}" type="datetimeFigureOut">
               <a:rPr lang="en-US" smtClean="0"/>
-              <a:t>20/07/2015</a:t>
+              <a:t>7/21/2015</a:t>
             </a:fld>
             <a:endParaRPr lang="en-US"/>
           </a:p>
@@ -386,7 +388,7 @@
           <a:p>
             <a:fld id="{DA005A0C-54D9-45AA-87D4-C551D08DFCE1}" type="datetimeFigureOut">
               <a:rPr lang="en-US" smtClean="0"/>
-              <a:t>20/07/2015</a:t>
+              <a:t>7/21/2015</a:t>
             </a:fld>
             <a:endParaRPr lang="en-US"/>
           </a:p>
@@ -17116,12 +17118,12 @@
       </p:grpSpPr>
       <p:sp>
         <p:nvSpPr>
-          <p:cNvPr id="2" name="Title 1"/>
+          <p:cNvPr id="6" name="Subtitle 5"/>
           <p:cNvSpPr>
             <a:spLocks noGrp="1"/>
           </p:cNvSpPr>
           <p:nvPr>
-            <p:ph type="title"/>
+            <p:ph type="subTitle" idx="1"/>
           </p:nvPr>
         </p:nvSpPr>
         <p:spPr/>
@@ -17130,465 +17132,34 @@
           <a:lstStyle/>
           <a:p>
             <a:r>
+              <a:rPr lang="en-US" dirty="0"/>
+              <a:t>Creating </a:t>
+            </a:r>
+            <a:r>
               <a:rPr lang="en-US" dirty="0" smtClean="0"/>
-              <a:t>Creating a Simple Express Application</a:t>
+              <a:t>an Express application</a:t>
             </a:r>
             <a:endParaRPr lang="en-US" dirty="0"/>
-          </a:p>
-        </p:txBody>
-      </p:sp>
-      <p:sp>
-        <p:nvSpPr>
-          <p:cNvPr id="3" name="Content Placeholder 2"/>
-          <p:cNvSpPr>
-            <a:spLocks noGrp="1"/>
-          </p:cNvSpPr>
-          <p:nvPr>
-            <p:ph idx="1"/>
-          </p:nvPr>
-        </p:nvSpPr>
-        <p:spPr>
-          <a:xfrm>
-            <a:off x="560798" y="2598719"/>
-            <a:ext cx="9323431" cy="2922515"/>
-          </a:xfrm>
-        </p:spPr>
-        <p:style>
-          <a:lnRef idx="2">
-            <a:schemeClr val="dk1"/>
-          </a:lnRef>
-          <a:fillRef idx="1">
-            <a:schemeClr val="lt1"/>
-          </a:fillRef>
-          <a:effectRef idx="0">
-            <a:schemeClr val="dk1"/>
-          </a:effectRef>
-          <a:fontRef idx="minor">
-            <a:schemeClr val="dk1"/>
-          </a:fontRef>
-        </p:style>
-        <p:txBody>
-          <a:bodyPr>
-            <a:normAutofit/>
-          </a:bodyPr>
-          <a:lstStyle/>
-          <a:p>
-            <a:pPr marL="0" lvl="0" indent="0" defTabSz="914400" eaLnBrk="0" fontAlgn="base" hangingPunct="0">
-              <a:spcBef>
-                <a:spcPct val="0"/>
-              </a:spcBef>
-              <a:spcAft>
-                <a:spcPct val="0"/>
-              </a:spcAft>
-              <a:buNone/>
-            </a:pPr>
-            <a:r>
-              <a:rPr lang="en-US" altLang="en-US" sz="2400" dirty="0" err="1">
-                <a:solidFill>
-                  <a:srgbClr val="0000FF"/>
-                </a:solidFill>
-                <a:latin typeface="Consolas" panose="020B0609020204030204" pitchFamily="49" charset="0"/>
-                <a:cs typeface="Consolas" panose="020B0609020204030204" pitchFamily="49" charset="0"/>
-              </a:rPr>
-              <a:t>var</a:t>
-            </a:r>
-            <a:r>
-              <a:rPr lang="en-US" altLang="en-US" sz="2400" dirty="0">
-                <a:solidFill>
-                  <a:srgbClr val="000000"/>
-                </a:solidFill>
-                <a:latin typeface="Consolas" panose="020B0609020204030204" pitchFamily="49" charset="0"/>
-                <a:cs typeface="Consolas" panose="020B0609020204030204" pitchFamily="49" charset="0"/>
-              </a:rPr>
-              <a:t> express = require(</a:t>
-            </a:r>
-            <a:r>
-              <a:rPr lang="en-US" altLang="en-US" sz="2400" dirty="0">
-                <a:solidFill>
-                  <a:srgbClr val="A31515"/>
-                </a:solidFill>
-                <a:latin typeface="Consolas" panose="020B0609020204030204" pitchFamily="49" charset="0"/>
-                <a:cs typeface="Consolas" panose="020B0609020204030204" pitchFamily="49" charset="0"/>
-              </a:rPr>
-              <a:t>'express'</a:t>
-            </a:r>
-            <a:r>
-              <a:rPr lang="en-US" altLang="en-US" sz="2400" dirty="0">
-                <a:solidFill>
-                  <a:srgbClr val="000000"/>
-                </a:solidFill>
-                <a:latin typeface="Consolas" panose="020B0609020204030204" pitchFamily="49" charset="0"/>
-                <a:cs typeface="Consolas" panose="020B0609020204030204" pitchFamily="49" charset="0"/>
-              </a:rPr>
-              <a:t>); </a:t>
-            </a:r>
-          </a:p>
-          <a:p>
-            <a:pPr marL="0" lvl="0" indent="0" defTabSz="914400" eaLnBrk="0" fontAlgn="base" hangingPunct="0">
-              <a:spcBef>
-                <a:spcPct val="0"/>
-              </a:spcBef>
-              <a:spcAft>
-                <a:spcPct val="0"/>
-              </a:spcAft>
-              <a:buNone/>
-            </a:pPr>
-            <a:r>
-              <a:rPr lang="en-US" altLang="en-US" sz="2400" dirty="0" err="1">
-                <a:solidFill>
-                  <a:srgbClr val="0000FF"/>
-                </a:solidFill>
-                <a:latin typeface="Consolas" panose="020B0609020204030204" pitchFamily="49" charset="0"/>
-                <a:cs typeface="Consolas" panose="020B0609020204030204" pitchFamily="49" charset="0"/>
-              </a:rPr>
-              <a:t>var</a:t>
-            </a:r>
-            <a:r>
-              <a:rPr lang="en-US" altLang="en-US" sz="2400" dirty="0">
-                <a:solidFill>
-                  <a:srgbClr val="000000"/>
-                </a:solidFill>
-                <a:latin typeface="Consolas" panose="020B0609020204030204" pitchFamily="49" charset="0"/>
-                <a:cs typeface="Consolas" panose="020B0609020204030204" pitchFamily="49" charset="0"/>
-              </a:rPr>
-              <a:t> app = express();</a:t>
-            </a:r>
-          </a:p>
-          <a:p>
-            <a:pPr marL="0" lvl="0" indent="0" defTabSz="914400" eaLnBrk="0" fontAlgn="base" hangingPunct="0">
-              <a:spcBef>
-                <a:spcPct val="0"/>
-              </a:spcBef>
-              <a:spcAft>
-                <a:spcPct val="0"/>
-              </a:spcAft>
-              <a:buNone/>
-            </a:pPr>
-            <a:endParaRPr lang="en-US" altLang="en-US" sz="2400" dirty="0">
-              <a:solidFill>
-                <a:srgbClr val="000000"/>
-              </a:solidFill>
-              <a:latin typeface="Consolas" panose="020B0609020204030204" pitchFamily="49" charset="0"/>
-              <a:cs typeface="Consolas" panose="020B0609020204030204" pitchFamily="49" charset="0"/>
-            </a:endParaRPr>
-          </a:p>
-          <a:p>
-            <a:pPr marL="0" lvl="0" indent="0" defTabSz="914400" eaLnBrk="0" fontAlgn="base" hangingPunct="0">
-              <a:spcBef>
-                <a:spcPct val="0"/>
-              </a:spcBef>
-              <a:spcAft>
-                <a:spcPct val="0"/>
-              </a:spcAft>
-              <a:buNone/>
-            </a:pPr>
-            <a:r>
-              <a:rPr lang="en-US" altLang="en-US" sz="2400" dirty="0" err="1">
-                <a:solidFill>
-                  <a:srgbClr val="000000"/>
-                </a:solidFill>
-                <a:latin typeface="Consolas" panose="020B0609020204030204" pitchFamily="49" charset="0"/>
-                <a:cs typeface="Consolas" panose="020B0609020204030204" pitchFamily="49" charset="0"/>
-              </a:rPr>
-              <a:t>app.</a:t>
-            </a:r>
-            <a:r>
-              <a:rPr lang="en-US" altLang="en-US" sz="2400" dirty="0" err="1">
-                <a:solidFill>
-                  <a:srgbClr val="0000FF"/>
-                </a:solidFill>
-                <a:latin typeface="Consolas" panose="020B0609020204030204" pitchFamily="49" charset="0"/>
-                <a:cs typeface="Consolas" panose="020B0609020204030204" pitchFamily="49" charset="0"/>
-              </a:rPr>
-              <a:t>get</a:t>
-            </a:r>
-            <a:r>
-              <a:rPr lang="en-US" altLang="en-US" sz="2400" dirty="0">
-                <a:solidFill>
-                  <a:srgbClr val="000000"/>
-                </a:solidFill>
-                <a:latin typeface="Consolas" panose="020B0609020204030204" pitchFamily="49" charset="0"/>
-                <a:cs typeface="Consolas" panose="020B0609020204030204" pitchFamily="49" charset="0"/>
-              </a:rPr>
-              <a:t>(</a:t>
-            </a:r>
-            <a:r>
-              <a:rPr lang="en-US" altLang="en-US" sz="2400" dirty="0">
-                <a:solidFill>
-                  <a:srgbClr val="A31515"/>
-                </a:solidFill>
-                <a:latin typeface="Consolas" panose="020B0609020204030204" pitchFamily="49" charset="0"/>
-                <a:cs typeface="Consolas" panose="020B0609020204030204" pitchFamily="49" charset="0"/>
-              </a:rPr>
-              <a:t>'/'</a:t>
-            </a:r>
-            <a:r>
-              <a:rPr lang="en-US" altLang="en-US" sz="2400" dirty="0">
-                <a:solidFill>
-                  <a:srgbClr val="000000"/>
-                </a:solidFill>
-                <a:latin typeface="Consolas" panose="020B0609020204030204" pitchFamily="49" charset="0"/>
-                <a:cs typeface="Consolas" panose="020B0609020204030204" pitchFamily="49" charset="0"/>
-              </a:rPr>
-              <a:t>, </a:t>
-            </a:r>
-            <a:r>
-              <a:rPr lang="en-US" altLang="en-US" sz="2400" dirty="0">
-                <a:solidFill>
-                  <a:srgbClr val="0000FF"/>
-                </a:solidFill>
-                <a:latin typeface="Consolas" panose="020B0609020204030204" pitchFamily="49" charset="0"/>
-                <a:cs typeface="Consolas" panose="020B0609020204030204" pitchFamily="49" charset="0"/>
-              </a:rPr>
-              <a:t>function</a:t>
-            </a:r>
-            <a:r>
-              <a:rPr lang="en-US" altLang="en-US" sz="2400" dirty="0">
-                <a:solidFill>
-                  <a:srgbClr val="000000"/>
-                </a:solidFill>
-                <a:latin typeface="Consolas" panose="020B0609020204030204" pitchFamily="49" charset="0"/>
-                <a:cs typeface="Consolas" panose="020B0609020204030204" pitchFamily="49" charset="0"/>
-              </a:rPr>
-              <a:t> (</a:t>
-            </a:r>
-            <a:r>
-              <a:rPr lang="en-US" altLang="en-US" sz="2400" dirty="0" err="1">
-                <a:solidFill>
-                  <a:srgbClr val="000000"/>
-                </a:solidFill>
-                <a:latin typeface="Consolas" panose="020B0609020204030204" pitchFamily="49" charset="0"/>
-                <a:cs typeface="Consolas" panose="020B0609020204030204" pitchFamily="49" charset="0"/>
-              </a:rPr>
-              <a:t>req</a:t>
-            </a:r>
-            <a:r>
-              <a:rPr lang="en-US" altLang="en-US" sz="2400" dirty="0">
-                <a:solidFill>
-                  <a:srgbClr val="000000"/>
-                </a:solidFill>
-                <a:latin typeface="Consolas" panose="020B0609020204030204" pitchFamily="49" charset="0"/>
-                <a:cs typeface="Consolas" panose="020B0609020204030204" pitchFamily="49" charset="0"/>
-              </a:rPr>
-              <a:t>, res) { </a:t>
-            </a:r>
-          </a:p>
-          <a:p>
-            <a:pPr marL="0" lvl="0" indent="0" defTabSz="914400" eaLnBrk="0" fontAlgn="base" hangingPunct="0">
-              <a:spcBef>
-                <a:spcPct val="0"/>
-              </a:spcBef>
-              <a:spcAft>
-                <a:spcPct val="0"/>
-              </a:spcAft>
-              <a:buNone/>
-            </a:pPr>
-            <a:r>
-              <a:rPr lang="en-US" altLang="en-US" sz="2400" dirty="0">
-                <a:solidFill>
-                  <a:srgbClr val="000000"/>
-                </a:solidFill>
-                <a:latin typeface="Consolas" panose="020B0609020204030204" pitchFamily="49" charset="0"/>
-                <a:cs typeface="Consolas" panose="020B0609020204030204" pitchFamily="49" charset="0"/>
-              </a:rPr>
-              <a:t>    </a:t>
-            </a:r>
-            <a:r>
-              <a:rPr lang="en-US" altLang="en-US" sz="2400" dirty="0" err="1">
-                <a:solidFill>
-                  <a:srgbClr val="000000"/>
-                </a:solidFill>
-                <a:latin typeface="Consolas" panose="020B0609020204030204" pitchFamily="49" charset="0"/>
-                <a:cs typeface="Consolas" panose="020B0609020204030204" pitchFamily="49" charset="0"/>
-              </a:rPr>
-              <a:t>res.json</a:t>
-            </a:r>
-            <a:r>
-              <a:rPr lang="en-US" altLang="en-US" sz="2400" dirty="0">
-                <a:solidFill>
-                  <a:srgbClr val="000000"/>
-                </a:solidFill>
-                <a:latin typeface="Consolas" panose="020B0609020204030204" pitchFamily="49" charset="0"/>
-                <a:cs typeface="Consolas" panose="020B0609020204030204" pitchFamily="49" charset="0"/>
-              </a:rPr>
-              <a:t>({</a:t>
-            </a:r>
-            <a:r>
-              <a:rPr lang="en-US" altLang="en-US" sz="2400" dirty="0" err="1">
-                <a:solidFill>
-                  <a:srgbClr val="000000"/>
-                </a:solidFill>
-                <a:latin typeface="Consolas" panose="020B0609020204030204" pitchFamily="49" charset="0"/>
-                <a:cs typeface="Consolas" panose="020B0609020204030204" pitchFamily="49" charset="0"/>
-              </a:rPr>
-              <a:t>message:</a:t>
-            </a:r>
-            <a:r>
-              <a:rPr lang="en-US" altLang="en-US" sz="2400" dirty="0" err="1">
-                <a:solidFill>
-                  <a:srgbClr val="A31515"/>
-                </a:solidFill>
-                <a:latin typeface="Consolas" panose="020B0609020204030204" pitchFamily="49" charset="0"/>
-                <a:cs typeface="Consolas" panose="020B0609020204030204" pitchFamily="49" charset="0"/>
-              </a:rPr>
-              <a:t>'hooray</a:t>
-            </a:r>
-            <a:r>
-              <a:rPr lang="en-US" altLang="en-US" sz="2400" dirty="0">
-                <a:solidFill>
-                  <a:srgbClr val="A31515"/>
-                </a:solidFill>
-                <a:latin typeface="Consolas" panose="020B0609020204030204" pitchFamily="49" charset="0"/>
-                <a:cs typeface="Consolas" panose="020B0609020204030204" pitchFamily="49" charset="0"/>
-              </a:rPr>
-              <a:t>! welcome to our </a:t>
-            </a:r>
-            <a:r>
-              <a:rPr lang="en-US" altLang="en-US" sz="2400" dirty="0" err="1">
-                <a:solidFill>
-                  <a:srgbClr val="A31515"/>
-                </a:solidFill>
-                <a:latin typeface="Consolas" panose="020B0609020204030204" pitchFamily="49" charset="0"/>
-                <a:cs typeface="Consolas" panose="020B0609020204030204" pitchFamily="49" charset="0"/>
-              </a:rPr>
-              <a:t>api</a:t>
-            </a:r>
-            <a:r>
-              <a:rPr lang="en-US" altLang="en-US" sz="2400" dirty="0">
-                <a:solidFill>
-                  <a:srgbClr val="A31515"/>
-                </a:solidFill>
-                <a:latin typeface="Consolas" panose="020B0609020204030204" pitchFamily="49" charset="0"/>
-                <a:cs typeface="Consolas" panose="020B0609020204030204" pitchFamily="49" charset="0"/>
-              </a:rPr>
-              <a:t>!'</a:t>
-            </a:r>
-            <a:r>
-              <a:rPr lang="en-US" altLang="en-US" sz="2400" dirty="0">
-                <a:solidFill>
-                  <a:srgbClr val="000000"/>
-                </a:solidFill>
-                <a:latin typeface="Consolas" panose="020B0609020204030204" pitchFamily="49" charset="0"/>
-                <a:cs typeface="Consolas" panose="020B0609020204030204" pitchFamily="49" charset="0"/>
-              </a:rPr>
-              <a:t>});</a:t>
-            </a:r>
-          </a:p>
-          <a:p>
-            <a:pPr marL="0" lvl="0" indent="0" defTabSz="914400" eaLnBrk="0" fontAlgn="base" hangingPunct="0">
-              <a:spcBef>
-                <a:spcPct val="0"/>
-              </a:spcBef>
-              <a:spcAft>
-                <a:spcPct val="0"/>
-              </a:spcAft>
-              <a:buNone/>
-            </a:pPr>
-            <a:r>
-              <a:rPr lang="en-US" altLang="en-US" sz="2400" dirty="0">
-                <a:solidFill>
-                  <a:srgbClr val="000000"/>
-                </a:solidFill>
-                <a:latin typeface="Consolas" panose="020B0609020204030204" pitchFamily="49" charset="0"/>
-                <a:cs typeface="Consolas" panose="020B0609020204030204" pitchFamily="49" charset="0"/>
-              </a:rPr>
-              <a:t>});</a:t>
-            </a:r>
-          </a:p>
-          <a:p>
-            <a:pPr marL="0" lvl="0" indent="0" defTabSz="914400" eaLnBrk="0" fontAlgn="base" hangingPunct="0">
-              <a:spcBef>
-                <a:spcPct val="0"/>
-              </a:spcBef>
-              <a:spcAft>
-                <a:spcPct val="0"/>
-              </a:spcAft>
-              <a:buNone/>
-            </a:pPr>
-            <a:endParaRPr lang="en-US" altLang="en-US" sz="2400" dirty="0">
-              <a:solidFill>
-                <a:srgbClr val="000000"/>
-              </a:solidFill>
-              <a:latin typeface="Consolas" panose="020B0609020204030204" pitchFamily="49" charset="0"/>
-              <a:cs typeface="Consolas" panose="020B0609020204030204" pitchFamily="49" charset="0"/>
-            </a:endParaRPr>
-          </a:p>
-          <a:p>
-            <a:pPr marL="0" lvl="0" indent="0" defTabSz="914400" eaLnBrk="0" fontAlgn="base" hangingPunct="0">
-              <a:spcBef>
-                <a:spcPct val="0"/>
-              </a:spcBef>
-              <a:spcAft>
-                <a:spcPct val="0"/>
-              </a:spcAft>
-              <a:buNone/>
-            </a:pPr>
-            <a:r>
-              <a:rPr lang="en-US" altLang="en-US" sz="2400" dirty="0" err="1">
-                <a:solidFill>
-                  <a:srgbClr val="000000"/>
-                </a:solidFill>
-                <a:latin typeface="Consolas" panose="020B0609020204030204" pitchFamily="49" charset="0"/>
-                <a:cs typeface="Consolas" panose="020B0609020204030204" pitchFamily="49" charset="0"/>
-              </a:rPr>
-              <a:t>app.listen</a:t>
-            </a:r>
-            <a:r>
-              <a:rPr lang="en-US" altLang="en-US" sz="2400" dirty="0">
-                <a:solidFill>
-                  <a:srgbClr val="000000"/>
-                </a:solidFill>
-                <a:latin typeface="Consolas" panose="020B0609020204030204" pitchFamily="49" charset="0"/>
-                <a:cs typeface="Consolas" panose="020B0609020204030204" pitchFamily="49" charset="0"/>
-              </a:rPr>
-              <a:t>(</a:t>
-            </a:r>
-            <a:r>
-              <a:rPr lang="en-US" altLang="en-US" sz="2400" dirty="0" err="1">
-                <a:solidFill>
-                  <a:srgbClr val="000000"/>
-                </a:solidFill>
-                <a:latin typeface="Consolas" panose="020B0609020204030204" pitchFamily="49" charset="0"/>
-                <a:cs typeface="Consolas" panose="020B0609020204030204" pitchFamily="49" charset="0"/>
-              </a:rPr>
-              <a:t>process.env.PORT</a:t>
-            </a:r>
-            <a:r>
-              <a:rPr lang="en-US" altLang="en-US" sz="2400" dirty="0">
-                <a:solidFill>
-                  <a:srgbClr val="000000"/>
-                </a:solidFill>
-                <a:latin typeface="Consolas" panose="020B0609020204030204" pitchFamily="49" charset="0"/>
-                <a:cs typeface="Consolas" panose="020B0609020204030204" pitchFamily="49" charset="0"/>
-              </a:rPr>
-              <a:t> || 8080); </a:t>
-            </a:r>
-            <a:endParaRPr lang="en-US" altLang="en-US" sz="4800" dirty="0">
-              <a:latin typeface="Arial" panose="020B0604020202020204" pitchFamily="34" charset="0"/>
-            </a:endParaRPr>
-          </a:p>
-          <a:p>
-            <a:endParaRPr lang="en-US" sz="2400" dirty="0"/>
           </a:p>
         </p:txBody>
       </p:sp>
     </p:spTree>
     <p:extLst>
       <p:ext uri="{BB962C8B-B14F-4D97-AF65-F5344CB8AC3E}">
-        <p14:creationId xmlns:p14="http://schemas.microsoft.com/office/powerpoint/2010/main" val="320952498"/>
+        <p14:creationId xmlns:p14="http://schemas.microsoft.com/office/powerpoint/2010/main" val="3016287964"/>
       </p:ext>
     </p:extLst>
   </p:cSld>
   <p:clrMapOvr>
     <a:masterClrMapping/>
   </p:clrMapOvr>
-  <mc:AlternateContent xmlns:mc="http://schemas.openxmlformats.org/markup-compatibility/2006" xmlns:p14="http://schemas.microsoft.com/office/powerpoint/2010/main">
-    <mc:Choice Requires="p14">
+  <mc:AlternateContent xmlns:mc="http://schemas.openxmlformats.org/markup-compatibility/2006">
+    <mc:Choice xmlns:p14="http://schemas.microsoft.com/office/powerpoint/2010/main" Requires="p14">
       <p:transition spd="med" p14:dur="700">
         <p:fade/>
       </p:transition>
     </mc:Choice>
-    <mc:Fallback xmlns="">
+    <mc:Fallback>
       <p:transition spd="med">
         <p:fade/>
       </p:transition>
@@ -17623,12 +17194,50 @@
       </p:grpSpPr>
       <p:sp>
         <p:nvSpPr>
-          <p:cNvPr id="6" name="Subtitle 5"/>
+          <p:cNvPr id="4" name="Rectangle 3"/>
+          <p:cNvSpPr/>
+          <p:nvPr/>
+        </p:nvSpPr>
+        <p:spPr>
+          <a:xfrm>
+            <a:off x="560798" y="5477691"/>
+            <a:ext cx="7294333" cy="614884"/>
+          </a:xfrm>
+          <a:prstGeom prst="rect">
+            <a:avLst/>
+          </a:prstGeom>
+        </p:spPr>
+        <p:style>
+          <a:lnRef idx="2">
+            <a:schemeClr val="dk1"/>
+          </a:lnRef>
+          <a:fillRef idx="1">
+            <a:schemeClr val="lt1"/>
+          </a:fillRef>
+          <a:effectRef idx="0">
+            <a:schemeClr val="dk1"/>
+          </a:effectRef>
+          <a:fontRef idx="minor">
+            <a:schemeClr val="dk1"/>
+          </a:fontRef>
+        </p:style>
+        <p:txBody>
+          <a:bodyPr rtlCol="0" anchor="ctr"/>
+          <a:lstStyle/>
+          <a:p>
+            <a:pPr algn="ctr"/>
+            <a:endParaRPr lang="en-US"/>
+          </a:p>
+        </p:txBody>
+      </p:sp>
+      <p:sp>
+        <p:nvSpPr>
+          <p:cNvPr id="2" name="Title 1"/>
           <p:cNvSpPr>
             <a:spLocks noGrp="1"/>
           </p:cNvSpPr>
           <p:nvPr>
-            <p:ph type="subTitle" idx="1"/>
+            <p:ph type="title"/>
           </p:nvPr>
         </p:nvSpPr>
         <p:spPr/>
@@ -17637,16 +17246,218 @@
           <a:lstStyle/>
           <a:p>
             <a:r>
-              <a:rPr lang="en-US" dirty="0"/>
-              <a:t>Creating a simple Rest API with Express Framework</a:t>
-            </a:r>
+              <a:rPr lang="en-US" dirty="0" smtClean="0"/>
+              <a:t>Explanation of Routes</a:t>
+            </a:r>
+            <a:endParaRPr lang="en-US" dirty="0"/>
+          </a:p>
+        </p:txBody>
+      </p:sp>
+      <p:sp>
+        <p:nvSpPr>
+          <p:cNvPr id="3" name="Content Placeholder 2"/>
+          <p:cNvSpPr>
+            <a:spLocks noGrp="1"/>
+          </p:cNvSpPr>
+          <p:nvPr>
+            <p:ph idx="1"/>
+          </p:nvPr>
+        </p:nvSpPr>
+        <p:spPr/>
+        <p:txBody>
+          <a:bodyPr>
+            <a:normAutofit fontScale="92500"/>
+          </a:bodyPr>
+          <a:lstStyle/>
+          <a:p>
+            <a:r>
+              <a:rPr lang="en-US" dirty="0" smtClean="0"/>
+              <a:t>A router maps HTTP requests to a callback. </a:t>
+            </a:r>
+          </a:p>
+          <a:p>
+            <a:r>
+              <a:rPr lang="en-US" dirty="0" smtClean="0"/>
+              <a:t>HTTP requests can be sent as GET/POST/PUT/DELETE, etc.</a:t>
+            </a:r>
+          </a:p>
+          <a:p>
+            <a:r>
+              <a:rPr lang="en-US" dirty="0" smtClean="0"/>
+              <a:t>URLs describe the location targeted. </a:t>
+            </a:r>
+          </a:p>
+          <a:p>
+            <a:r>
+              <a:rPr lang="en-US" dirty="0" smtClean="0"/>
+              <a:t>Node helps you map a HTTP GET request like: </a:t>
+            </a:r>
+          </a:p>
+          <a:p>
+            <a:pPr lvl="1"/>
+            <a:r>
+              <a:rPr lang="en-US" dirty="0" smtClean="0"/>
+              <a:t>http://localhost:8888/index</a:t>
+            </a:r>
+          </a:p>
+          <a:p>
+            <a:r>
+              <a:rPr lang="en-US" dirty="0" smtClean="0"/>
+              <a:t>To a request handler (callback)</a:t>
+            </a:r>
+          </a:p>
+          <a:p>
+            <a:pPr marL="0" lvl="0" indent="0" defTabSz="914400" eaLnBrk="0" fontAlgn="base" hangingPunct="0">
+              <a:spcBef>
+                <a:spcPct val="0"/>
+              </a:spcBef>
+              <a:spcAft>
+                <a:spcPct val="0"/>
+              </a:spcAft>
+              <a:buNone/>
+            </a:pPr>
+            <a:endParaRPr lang="en-US" altLang="en-US" dirty="0" smtClean="0">
+              <a:solidFill>
+                <a:srgbClr val="000000"/>
+              </a:solidFill>
+              <a:latin typeface="Consolas" panose="020B0609020204030204" pitchFamily="49" charset="0"/>
+              <a:cs typeface="Consolas" panose="020B0609020204030204" pitchFamily="49" charset="0"/>
+            </a:endParaRPr>
+          </a:p>
+          <a:p>
+            <a:pPr marL="0" lvl="0" indent="0" defTabSz="914400" eaLnBrk="0" fontAlgn="base" hangingPunct="0">
+              <a:spcBef>
+                <a:spcPct val="0"/>
+              </a:spcBef>
+              <a:spcAft>
+                <a:spcPct val="0"/>
+              </a:spcAft>
+              <a:buNone/>
+            </a:pPr>
+            <a:r>
+              <a:rPr lang="en-US" altLang="en-US" sz="2600" dirty="0" err="1" smtClean="0">
+                <a:solidFill>
+                  <a:srgbClr val="000000"/>
+                </a:solidFill>
+                <a:latin typeface="Consolas" panose="020B0609020204030204" pitchFamily="49" charset="0"/>
+                <a:cs typeface="Consolas" panose="020B0609020204030204" pitchFamily="49" charset="0"/>
+              </a:rPr>
+              <a:t>app.</a:t>
+            </a:r>
+            <a:r>
+              <a:rPr lang="en-US" altLang="en-US" sz="2600" dirty="0" err="1" smtClean="0">
+                <a:solidFill>
+                  <a:srgbClr val="0000FF"/>
+                </a:solidFill>
+                <a:latin typeface="Consolas" panose="020B0609020204030204" pitchFamily="49" charset="0"/>
+                <a:cs typeface="Consolas" panose="020B0609020204030204" pitchFamily="49" charset="0"/>
+              </a:rPr>
+              <a:t>get</a:t>
+            </a:r>
+            <a:r>
+              <a:rPr lang="en-US" altLang="en-US" sz="2600" dirty="0" smtClean="0">
+                <a:solidFill>
+                  <a:srgbClr val="000000"/>
+                </a:solidFill>
+                <a:latin typeface="Consolas" panose="020B0609020204030204" pitchFamily="49" charset="0"/>
+                <a:cs typeface="Consolas" panose="020B0609020204030204" pitchFamily="49" charset="0"/>
+              </a:rPr>
+              <a:t>(</a:t>
+            </a:r>
+            <a:r>
+              <a:rPr lang="en-US" altLang="en-US" sz="2600" dirty="0" smtClean="0">
+                <a:solidFill>
+                  <a:srgbClr val="A31515"/>
+                </a:solidFill>
+                <a:latin typeface="Consolas" panose="020B0609020204030204" pitchFamily="49" charset="0"/>
+                <a:cs typeface="Consolas" panose="020B0609020204030204" pitchFamily="49" charset="0"/>
+              </a:rPr>
+              <a:t>'/index'</a:t>
+            </a:r>
+            <a:r>
+              <a:rPr lang="en-US" altLang="en-US" sz="2600" dirty="0" smtClean="0">
+                <a:solidFill>
+                  <a:srgbClr val="000000"/>
+                </a:solidFill>
+                <a:latin typeface="Consolas" panose="020B0609020204030204" pitchFamily="49" charset="0"/>
+                <a:cs typeface="Consolas" panose="020B0609020204030204" pitchFamily="49" charset="0"/>
+              </a:rPr>
+              <a:t>,</a:t>
+            </a:r>
+            <a:r>
+              <a:rPr lang="en-US" altLang="en-US" sz="2600" dirty="0">
+                <a:solidFill>
+                  <a:srgbClr val="000000"/>
+                </a:solidFill>
+                <a:latin typeface="Consolas" panose="020B0609020204030204" pitchFamily="49" charset="0"/>
+                <a:cs typeface="Consolas" panose="020B0609020204030204" pitchFamily="49" charset="0"/>
+              </a:rPr>
+              <a:t> </a:t>
+            </a:r>
+            <a:r>
+              <a:rPr lang="en-US" altLang="en-US" sz="2600" dirty="0">
+                <a:solidFill>
+                  <a:srgbClr val="0000FF"/>
+                </a:solidFill>
+                <a:latin typeface="Consolas" panose="020B0609020204030204" pitchFamily="49" charset="0"/>
+                <a:cs typeface="Consolas" panose="020B0609020204030204" pitchFamily="49" charset="0"/>
+              </a:rPr>
+              <a:t>function</a:t>
+            </a:r>
+            <a:r>
+              <a:rPr lang="en-US" altLang="en-US" sz="2600" dirty="0">
+                <a:solidFill>
+                  <a:srgbClr val="000000"/>
+                </a:solidFill>
+                <a:latin typeface="Consolas" panose="020B0609020204030204" pitchFamily="49" charset="0"/>
+                <a:cs typeface="Consolas" panose="020B0609020204030204" pitchFamily="49" charset="0"/>
+              </a:rPr>
+              <a:t> (</a:t>
+            </a:r>
+            <a:r>
+              <a:rPr lang="en-US" altLang="en-US" sz="2600" dirty="0" err="1">
+                <a:solidFill>
+                  <a:srgbClr val="000000"/>
+                </a:solidFill>
+                <a:latin typeface="Consolas" panose="020B0609020204030204" pitchFamily="49" charset="0"/>
+                <a:cs typeface="Consolas" panose="020B0609020204030204" pitchFamily="49" charset="0"/>
+              </a:rPr>
+              <a:t>req</a:t>
+            </a:r>
+            <a:r>
+              <a:rPr lang="en-US" altLang="en-US" sz="2600" dirty="0">
+                <a:solidFill>
+                  <a:srgbClr val="000000"/>
+                </a:solidFill>
+                <a:latin typeface="Consolas" panose="020B0609020204030204" pitchFamily="49" charset="0"/>
+                <a:cs typeface="Consolas" panose="020B0609020204030204" pitchFamily="49" charset="0"/>
+              </a:rPr>
+              <a:t>, res) </a:t>
+            </a:r>
+            <a:r>
+              <a:rPr lang="en-US" altLang="en-US" sz="2600" dirty="0" smtClean="0">
+                <a:solidFill>
+                  <a:srgbClr val="000000"/>
+                </a:solidFill>
+                <a:latin typeface="Consolas" panose="020B0609020204030204" pitchFamily="49" charset="0"/>
+                <a:cs typeface="Consolas" panose="020B0609020204030204" pitchFamily="49" charset="0"/>
+              </a:rPr>
+              <a:t>{});</a:t>
+            </a:r>
+            <a:endParaRPr lang="en-US" altLang="en-US" dirty="0">
+              <a:solidFill>
+                <a:srgbClr val="000000"/>
+              </a:solidFill>
+              <a:latin typeface="Consolas" panose="020B0609020204030204" pitchFamily="49" charset="0"/>
+              <a:cs typeface="Consolas" panose="020B0609020204030204" pitchFamily="49" charset="0"/>
+            </a:endParaRPr>
           </a:p>
         </p:txBody>
       </p:sp>
     </p:spTree>
     <p:extLst>
       <p:ext uri="{BB962C8B-B14F-4D97-AF65-F5344CB8AC3E}">
-        <p14:creationId xmlns:p14="http://schemas.microsoft.com/office/powerpoint/2010/main" val="3237157129"/>
+        <p14:creationId xmlns:p14="http://schemas.microsoft.com/office/powerpoint/2010/main" val="4077999751"/>
       </p:ext>
     </p:extLst>
   </p:cSld>
@@ -17709,6 +17520,585 @@
           <a:p>
             <a:r>
               <a:rPr lang="en-US" dirty="0" smtClean="0"/>
+              <a:t>Creating a Simple Express Application</a:t>
+            </a:r>
+            <a:endParaRPr lang="en-US" dirty="0"/>
+          </a:p>
+        </p:txBody>
+      </p:sp>
+      <p:sp>
+        <p:nvSpPr>
+          <p:cNvPr id="3" name="Content Placeholder 2"/>
+          <p:cNvSpPr>
+            <a:spLocks noGrp="1"/>
+          </p:cNvSpPr>
+          <p:nvPr>
+            <p:ph idx="1"/>
+          </p:nvPr>
+        </p:nvSpPr>
+        <p:spPr>
+          <a:xfrm>
+            <a:off x="560798" y="2598719"/>
+            <a:ext cx="9323431" cy="2922515"/>
+          </a:xfrm>
+        </p:spPr>
+        <p:style>
+          <a:lnRef idx="2">
+            <a:schemeClr val="dk1"/>
+          </a:lnRef>
+          <a:fillRef idx="1">
+            <a:schemeClr val="lt1"/>
+          </a:fillRef>
+          <a:effectRef idx="0">
+            <a:schemeClr val="dk1"/>
+          </a:effectRef>
+          <a:fontRef idx="minor">
+            <a:schemeClr val="dk1"/>
+          </a:fontRef>
+        </p:style>
+        <p:txBody>
+          <a:bodyPr>
+            <a:normAutofit/>
+          </a:bodyPr>
+          <a:lstStyle/>
+          <a:p>
+            <a:pPr marL="0" lvl="0" indent="0" defTabSz="914400" eaLnBrk="0" fontAlgn="base" hangingPunct="0">
+              <a:spcBef>
+                <a:spcPct val="0"/>
+              </a:spcBef>
+              <a:spcAft>
+                <a:spcPct val="0"/>
+              </a:spcAft>
+              <a:buNone/>
+            </a:pPr>
+            <a:r>
+              <a:rPr lang="en-US" altLang="en-US" sz="2400" dirty="0" err="1">
+                <a:solidFill>
+                  <a:srgbClr val="0000FF"/>
+                </a:solidFill>
+                <a:latin typeface="Consolas" panose="020B0609020204030204" pitchFamily="49" charset="0"/>
+                <a:cs typeface="Consolas" panose="020B0609020204030204" pitchFamily="49" charset="0"/>
+              </a:rPr>
+              <a:t>var</a:t>
+            </a:r>
+            <a:r>
+              <a:rPr lang="en-US" altLang="en-US" sz="2400" dirty="0">
+                <a:solidFill>
+                  <a:srgbClr val="000000"/>
+                </a:solidFill>
+                <a:latin typeface="Consolas" panose="020B0609020204030204" pitchFamily="49" charset="0"/>
+                <a:cs typeface="Consolas" panose="020B0609020204030204" pitchFamily="49" charset="0"/>
+              </a:rPr>
+              <a:t> express = require(</a:t>
+            </a:r>
+            <a:r>
+              <a:rPr lang="en-US" altLang="en-US" sz="2400" dirty="0">
+                <a:solidFill>
+                  <a:srgbClr val="A31515"/>
+                </a:solidFill>
+                <a:latin typeface="Consolas" panose="020B0609020204030204" pitchFamily="49" charset="0"/>
+                <a:cs typeface="Consolas" panose="020B0609020204030204" pitchFamily="49" charset="0"/>
+              </a:rPr>
+              <a:t>'express'</a:t>
+            </a:r>
+            <a:r>
+              <a:rPr lang="en-US" altLang="en-US" sz="2400" dirty="0">
+                <a:solidFill>
+                  <a:srgbClr val="000000"/>
+                </a:solidFill>
+                <a:latin typeface="Consolas" panose="020B0609020204030204" pitchFamily="49" charset="0"/>
+                <a:cs typeface="Consolas" panose="020B0609020204030204" pitchFamily="49" charset="0"/>
+              </a:rPr>
+              <a:t>); </a:t>
+            </a:r>
+          </a:p>
+          <a:p>
+            <a:pPr marL="0" lvl="0" indent="0" defTabSz="914400" eaLnBrk="0" fontAlgn="base" hangingPunct="0">
+              <a:spcBef>
+                <a:spcPct val="0"/>
+              </a:spcBef>
+              <a:spcAft>
+                <a:spcPct val="0"/>
+              </a:spcAft>
+              <a:buNone/>
+            </a:pPr>
+            <a:r>
+              <a:rPr lang="en-US" altLang="en-US" sz="2400" dirty="0" err="1">
+                <a:solidFill>
+                  <a:srgbClr val="0000FF"/>
+                </a:solidFill>
+                <a:latin typeface="Consolas" panose="020B0609020204030204" pitchFamily="49" charset="0"/>
+                <a:cs typeface="Consolas" panose="020B0609020204030204" pitchFamily="49" charset="0"/>
+              </a:rPr>
+              <a:t>var</a:t>
+            </a:r>
+            <a:r>
+              <a:rPr lang="en-US" altLang="en-US" sz="2400" dirty="0">
+                <a:solidFill>
+                  <a:srgbClr val="000000"/>
+                </a:solidFill>
+                <a:latin typeface="Consolas" panose="020B0609020204030204" pitchFamily="49" charset="0"/>
+                <a:cs typeface="Consolas" panose="020B0609020204030204" pitchFamily="49" charset="0"/>
+              </a:rPr>
+              <a:t> app = express();</a:t>
+            </a:r>
+          </a:p>
+          <a:p>
+            <a:pPr marL="0" lvl="0" indent="0" defTabSz="914400" eaLnBrk="0" fontAlgn="base" hangingPunct="0">
+              <a:spcBef>
+                <a:spcPct val="0"/>
+              </a:spcBef>
+              <a:spcAft>
+                <a:spcPct val="0"/>
+              </a:spcAft>
+              <a:buNone/>
+            </a:pPr>
+            <a:endParaRPr lang="en-US" altLang="en-US" sz="2400" dirty="0">
+              <a:solidFill>
+                <a:srgbClr val="000000"/>
+              </a:solidFill>
+              <a:latin typeface="Consolas" panose="020B0609020204030204" pitchFamily="49" charset="0"/>
+              <a:cs typeface="Consolas" panose="020B0609020204030204" pitchFamily="49" charset="0"/>
+            </a:endParaRPr>
+          </a:p>
+          <a:p>
+            <a:pPr marL="0" lvl="0" indent="0" defTabSz="914400" eaLnBrk="0" fontAlgn="base" hangingPunct="0">
+              <a:spcBef>
+                <a:spcPct val="0"/>
+              </a:spcBef>
+              <a:spcAft>
+                <a:spcPct val="0"/>
+              </a:spcAft>
+              <a:buNone/>
+            </a:pPr>
+            <a:r>
+              <a:rPr lang="en-US" altLang="en-US" sz="2400" dirty="0" err="1">
+                <a:solidFill>
+                  <a:srgbClr val="000000"/>
+                </a:solidFill>
+                <a:latin typeface="Consolas" panose="020B0609020204030204" pitchFamily="49" charset="0"/>
+                <a:cs typeface="Consolas" panose="020B0609020204030204" pitchFamily="49" charset="0"/>
+              </a:rPr>
+              <a:t>app.</a:t>
+            </a:r>
+            <a:r>
+              <a:rPr lang="en-US" altLang="en-US" sz="2400" dirty="0" err="1">
+                <a:solidFill>
+                  <a:srgbClr val="0000FF"/>
+                </a:solidFill>
+                <a:latin typeface="Consolas" panose="020B0609020204030204" pitchFamily="49" charset="0"/>
+                <a:cs typeface="Consolas" panose="020B0609020204030204" pitchFamily="49" charset="0"/>
+              </a:rPr>
+              <a:t>get</a:t>
+            </a:r>
+            <a:r>
+              <a:rPr lang="en-US" altLang="en-US" sz="2400" dirty="0">
+                <a:solidFill>
+                  <a:srgbClr val="000000"/>
+                </a:solidFill>
+                <a:latin typeface="Consolas" panose="020B0609020204030204" pitchFamily="49" charset="0"/>
+                <a:cs typeface="Consolas" panose="020B0609020204030204" pitchFamily="49" charset="0"/>
+              </a:rPr>
+              <a:t>(</a:t>
+            </a:r>
+            <a:r>
+              <a:rPr lang="en-US" altLang="en-US" sz="2400" dirty="0">
+                <a:solidFill>
+                  <a:srgbClr val="A31515"/>
+                </a:solidFill>
+                <a:latin typeface="Consolas" panose="020B0609020204030204" pitchFamily="49" charset="0"/>
+                <a:cs typeface="Consolas" panose="020B0609020204030204" pitchFamily="49" charset="0"/>
+              </a:rPr>
+              <a:t>'/'</a:t>
+            </a:r>
+            <a:r>
+              <a:rPr lang="en-US" altLang="en-US" sz="2400" dirty="0">
+                <a:solidFill>
+                  <a:srgbClr val="000000"/>
+                </a:solidFill>
+                <a:latin typeface="Consolas" panose="020B0609020204030204" pitchFamily="49" charset="0"/>
+                <a:cs typeface="Consolas" panose="020B0609020204030204" pitchFamily="49" charset="0"/>
+              </a:rPr>
+              <a:t>, </a:t>
+            </a:r>
+            <a:r>
+              <a:rPr lang="en-US" altLang="en-US" sz="2400" dirty="0">
+                <a:solidFill>
+                  <a:srgbClr val="0000FF"/>
+                </a:solidFill>
+                <a:latin typeface="Consolas" panose="020B0609020204030204" pitchFamily="49" charset="0"/>
+                <a:cs typeface="Consolas" panose="020B0609020204030204" pitchFamily="49" charset="0"/>
+              </a:rPr>
+              <a:t>function</a:t>
+            </a:r>
+            <a:r>
+              <a:rPr lang="en-US" altLang="en-US" sz="2400" dirty="0">
+                <a:solidFill>
+                  <a:srgbClr val="000000"/>
+                </a:solidFill>
+                <a:latin typeface="Consolas" panose="020B0609020204030204" pitchFamily="49" charset="0"/>
+                <a:cs typeface="Consolas" panose="020B0609020204030204" pitchFamily="49" charset="0"/>
+              </a:rPr>
+              <a:t> (</a:t>
+            </a:r>
+            <a:r>
+              <a:rPr lang="en-US" altLang="en-US" sz="2400" dirty="0" err="1">
+                <a:solidFill>
+                  <a:srgbClr val="000000"/>
+                </a:solidFill>
+                <a:latin typeface="Consolas" panose="020B0609020204030204" pitchFamily="49" charset="0"/>
+                <a:cs typeface="Consolas" panose="020B0609020204030204" pitchFamily="49" charset="0"/>
+              </a:rPr>
+              <a:t>req</a:t>
+            </a:r>
+            <a:r>
+              <a:rPr lang="en-US" altLang="en-US" sz="2400" dirty="0">
+                <a:solidFill>
+                  <a:srgbClr val="000000"/>
+                </a:solidFill>
+                <a:latin typeface="Consolas" panose="020B0609020204030204" pitchFamily="49" charset="0"/>
+                <a:cs typeface="Consolas" panose="020B0609020204030204" pitchFamily="49" charset="0"/>
+              </a:rPr>
+              <a:t>, res) { </a:t>
+            </a:r>
+          </a:p>
+          <a:p>
+            <a:pPr marL="0" lvl="0" indent="0" defTabSz="914400" eaLnBrk="0" fontAlgn="base" hangingPunct="0">
+              <a:spcBef>
+                <a:spcPct val="0"/>
+              </a:spcBef>
+              <a:spcAft>
+                <a:spcPct val="0"/>
+              </a:spcAft>
+              <a:buNone/>
+            </a:pPr>
+            <a:r>
+              <a:rPr lang="en-US" altLang="en-US" sz="2400" dirty="0">
+                <a:solidFill>
+                  <a:srgbClr val="000000"/>
+                </a:solidFill>
+                <a:latin typeface="Consolas" panose="020B0609020204030204" pitchFamily="49" charset="0"/>
+                <a:cs typeface="Consolas" panose="020B0609020204030204" pitchFamily="49" charset="0"/>
+              </a:rPr>
+              <a:t>    </a:t>
+            </a:r>
+            <a:r>
+              <a:rPr lang="en-US" altLang="en-US" sz="2400" dirty="0" err="1">
+                <a:solidFill>
+                  <a:srgbClr val="000000"/>
+                </a:solidFill>
+                <a:latin typeface="Consolas" panose="020B0609020204030204" pitchFamily="49" charset="0"/>
+                <a:cs typeface="Consolas" panose="020B0609020204030204" pitchFamily="49" charset="0"/>
+              </a:rPr>
+              <a:t>res.json</a:t>
+            </a:r>
+            <a:r>
+              <a:rPr lang="en-US" altLang="en-US" sz="2400" dirty="0">
+                <a:solidFill>
+                  <a:srgbClr val="000000"/>
+                </a:solidFill>
+                <a:latin typeface="Consolas" panose="020B0609020204030204" pitchFamily="49" charset="0"/>
+                <a:cs typeface="Consolas" panose="020B0609020204030204" pitchFamily="49" charset="0"/>
+              </a:rPr>
+              <a:t>({</a:t>
+            </a:r>
+            <a:r>
+              <a:rPr lang="en-US" altLang="en-US" sz="2400" dirty="0" err="1">
+                <a:solidFill>
+                  <a:srgbClr val="000000"/>
+                </a:solidFill>
+                <a:latin typeface="Consolas" panose="020B0609020204030204" pitchFamily="49" charset="0"/>
+                <a:cs typeface="Consolas" panose="020B0609020204030204" pitchFamily="49" charset="0"/>
+              </a:rPr>
+              <a:t>message:</a:t>
+            </a:r>
+            <a:r>
+              <a:rPr lang="en-US" altLang="en-US" sz="2400" dirty="0" err="1">
+                <a:solidFill>
+                  <a:srgbClr val="A31515"/>
+                </a:solidFill>
+                <a:latin typeface="Consolas" panose="020B0609020204030204" pitchFamily="49" charset="0"/>
+                <a:cs typeface="Consolas" panose="020B0609020204030204" pitchFamily="49" charset="0"/>
+              </a:rPr>
+              <a:t>'hooray</a:t>
+            </a:r>
+            <a:r>
+              <a:rPr lang="en-US" altLang="en-US" sz="2400" dirty="0">
+                <a:solidFill>
+                  <a:srgbClr val="A31515"/>
+                </a:solidFill>
+                <a:latin typeface="Consolas" panose="020B0609020204030204" pitchFamily="49" charset="0"/>
+                <a:cs typeface="Consolas" panose="020B0609020204030204" pitchFamily="49" charset="0"/>
+              </a:rPr>
+              <a:t>! welcome to our </a:t>
+            </a:r>
+            <a:r>
+              <a:rPr lang="en-US" altLang="en-US" sz="2400" dirty="0" err="1">
+                <a:solidFill>
+                  <a:srgbClr val="A31515"/>
+                </a:solidFill>
+                <a:latin typeface="Consolas" panose="020B0609020204030204" pitchFamily="49" charset="0"/>
+                <a:cs typeface="Consolas" panose="020B0609020204030204" pitchFamily="49" charset="0"/>
+              </a:rPr>
+              <a:t>api</a:t>
+            </a:r>
+            <a:r>
+              <a:rPr lang="en-US" altLang="en-US" sz="2400" dirty="0">
+                <a:solidFill>
+                  <a:srgbClr val="A31515"/>
+                </a:solidFill>
+                <a:latin typeface="Consolas" panose="020B0609020204030204" pitchFamily="49" charset="0"/>
+                <a:cs typeface="Consolas" panose="020B0609020204030204" pitchFamily="49" charset="0"/>
+              </a:rPr>
+              <a:t>!'</a:t>
+            </a:r>
+            <a:r>
+              <a:rPr lang="en-US" altLang="en-US" sz="2400" dirty="0">
+                <a:solidFill>
+                  <a:srgbClr val="000000"/>
+                </a:solidFill>
+                <a:latin typeface="Consolas" panose="020B0609020204030204" pitchFamily="49" charset="0"/>
+                <a:cs typeface="Consolas" panose="020B0609020204030204" pitchFamily="49" charset="0"/>
+              </a:rPr>
+              <a:t>});</a:t>
+            </a:r>
+          </a:p>
+          <a:p>
+            <a:pPr marL="0" lvl="0" indent="0" defTabSz="914400" eaLnBrk="0" fontAlgn="base" hangingPunct="0">
+              <a:spcBef>
+                <a:spcPct val="0"/>
+              </a:spcBef>
+              <a:spcAft>
+                <a:spcPct val="0"/>
+              </a:spcAft>
+              <a:buNone/>
+            </a:pPr>
+            <a:r>
+              <a:rPr lang="en-US" altLang="en-US" sz="2400" dirty="0">
+                <a:solidFill>
+                  <a:srgbClr val="000000"/>
+                </a:solidFill>
+                <a:latin typeface="Consolas" panose="020B0609020204030204" pitchFamily="49" charset="0"/>
+                <a:cs typeface="Consolas" panose="020B0609020204030204" pitchFamily="49" charset="0"/>
+              </a:rPr>
+              <a:t>});</a:t>
+            </a:r>
+          </a:p>
+          <a:p>
+            <a:pPr marL="0" lvl="0" indent="0" defTabSz="914400" eaLnBrk="0" fontAlgn="base" hangingPunct="0">
+              <a:spcBef>
+                <a:spcPct val="0"/>
+              </a:spcBef>
+              <a:spcAft>
+                <a:spcPct val="0"/>
+              </a:spcAft>
+              <a:buNone/>
+            </a:pPr>
+            <a:endParaRPr lang="en-US" altLang="en-US" sz="2400" dirty="0">
+              <a:solidFill>
+                <a:srgbClr val="000000"/>
+              </a:solidFill>
+              <a:latin typeface="Consolas" panose="020B0609020204030204" pitchFamily="49" charset="0"/>
+              <a:cs typeface="Consolas" panose="020B0609020204030204" pitchFamily="49" charset="0"/>
+            </a:endParaRPr>
+          </a:p>
+          <a:p>
+            <a:pPr marL="0" lvl="0" indent="0" defTabSz="914400" eaLnBrk="0" fontAlgn="base" hangingPunct="0">
+              <a:spcBef>
+                <a:spcPct val="0"/>
+              </a:spcBef>
+              <a:spcAft>
+                <a:spcPct val="0"/>
+              </a:spcAft>
+              <a:buNone/>
+            </a:pPr>
+            <a:r>
+              <a:rPr lang="en-US" altLang="en-US" sz="2400" dirty="0" err="1">
+                <a:solidFill>
+                  <a:srgbClr val="000000"/>
+                </a:solidFill>
+                <a:latin typeface="Consolas" panose="020B0609020204030204" pitchFamily="49" charset="0"/>
+                <a:cs typeface="Consolas" panose="020B0609020204030204" pitchFamily="49" charset="0"/>
+              </a:rPr>
+              <a:t>app.listen</a:t>
+            </a:r>
+            <a:r>
+              <a:rPr lang="en-US" altLang="en-US" sz="2400" dirty="0">
+                <a:solidFill>
+                  <a:srgbClr val="000000"/>
+                </a:solidFill>
+                <a:latin typeface="Consolas" panose="020B0609020204030204" pitchFamily="49" charset="0"/>
+                <a:cs typeface="Consolas" panose="020B0609020204030204" pitchFamily="49" charset="0"/>
+              </a:rPr>
+              <a:t>(</a:t>
+            </a:r>
+            <a:r>
+              <a:rPr lang="en-US" altLang="en-US" sz="2400" dirty="0" err="1">
+                <a:solidFill>
+                  <a:srgbClr val="000000"/>
+                </a:solidFill>
+                <a:latin typeface="Consolas" panose="020B0609020204030204" pitchFamily="49" charset="0"/>
+                <a:cs typeface="Consolas" panose="020B0609020204030204" pitchFamily="49" charset="0"/>
+              </a:rPr>
+              <a:t>process.env.PORT</a:t>
+            </a:r>
+            <a:r>
+              <a:rPr lang="en-US" altLang="en-US" sz="2400" dirty="0">
+                <a:solidFill>
+                  <a:srgbClr val="000000"/>
+                </a:solidFill>
+                <a:latin typeface="Consolas" panose="020B0609020204030204" pitchFamily="49" charset="0"/>
+                <a:cs typeface="Consolas" panose="020B0609020204030204" pitchFamily="49" charset="0"/>
+              </a:rPr>
+              <a:t> || 8080); </a:t>
+            </a:r>
+            <a:endParaRPr lang="en-US" altLang="en-US" sz="4800" dirty="0">
+              <a:latin typeface="Arial" panose="020B0604020202020204" pitchFamily="34" charset="0"/>
+            </a:endParaRPr>
+          </a:p>
+          <a:p>
+            <a:endParaRPr lang="en-US" sz="2400" dirty="0"/>
+          </a:p>
+        </p:txBody>
+      </p:sp>
+    </p:spTree>
+    <p:extLst>
+      <p:ext uri="{BB962C8B-B14F-4D97-AF65-F5344CB8AC3E}">
+        <p14:creationId xmlns:p14="http://schemas.microsoft.com/office/powerpoint/2010/main" val="320952498"/>
+      </p:ext>
+    </p:extLst>
+  </p:cSld>
+  <p:clrMapOvr>
+    <a:masterClrMapping/>
+  </p:clrMapOvr>
+  <mc:AlternateContent xmlns:mc="http://schemas.openxmlformats.org/markup-compatibility/2006" xmlns:p14="http://schemas.microsoft.com/office/powerpoint/2010/main">
+    <mc:Choice Requires="p14">
+      <p:transition spd="med" p14:dur="700">
+        <p:fade/>
+      </p:transition>
+    </mc:Choice>
+    <mc:Fallback xmlns="">
+      <p:transition spd="med">
+        <p:fade/>
+      </p:transition>
+    </mc:Fallback>
+  </mc:AlternateContent>
+  <p:timing>
+    <p:tnLst>
+      <p:par>
+        <p:cTn id="1" dur="indefinite" restart="never" nodeType="tmRoot"/>
+      </p:par>
+    </p:tnLst>
+  </p:timing>
+</p:sld>
+</file>
+
+<file path=ppt/slides/slide13.xml><?xml version="1.0" encoding="utf-8"?>
+<p:sld xmlns:a="http://schemas.openxmlformats.org/drawingml/2006/main" xmlns:r="http://schemas.openxmlformats.org/officeDocument/2006/relationships" xmlns:p="http://schemas.openxmlformats.org/presentationml/2006/main">
+  <p:cSld>
+    <p:spTree>
+      <p:nvGrpSpPr>
+        <p:cNvPr id="1" name=""/>
+        <p:cNvGrpSpPr/>
+        <p:nvPr/>
+      </p:nvGrpSpPr>
+      <p:grpSpPr>
+        <a:xfrm>
+          <a:off x="0" y="0"/>
+          <a:ext cx="0" cy="0"/>
+          <a:chOff x="0" y="0"/>
+          <a:chExt cx="0" cy="0"/>
+        </a:xfrm>
+      </p:grpSpPr>
+      <p:sp>
+        <p:nvSpPr>
+          <p:cNvPr id="6" name="Subtitle 5"/>
+          <p:cNvSpPr>
+            <a:spLocks noGrp="1"/>
+          </p:cNvSpPr>
+          <p:nvPr>
+            <p:ph type="subTitle" idx="1"/>
+          </p:nvPr>
+        </p:nvSpPr>
+        <p:spPr/>
+        <p:txBody>
+          <a:bodyPr/>
+          <a:lstStyle/>
+          <a:p>
+            <a:r>
+              <a:rPr lang="en-US" dirty="0" smtClean="0"/>
+              <a:t>Adding a new route</a:t>
+            </a:r>
+            <a:endParaRPr lang="en-US" dirty="0"/>
+          </a:p>
+        </p:txBody>
+      </p:sp>
+    </p:spTree>
+    <p:extLst>
+      <p:ext uri="{BB962C8B-B14F-4D97-AF65-F5344CB8AC3E}">
+        <p14:creationId xmlns:p14="http://schemas.microsoft.com/office/powerpoint/2010/main" val="3237157129"/>
+      </p:ext>
+    </p:extLst>
+  </p:cSld>
+  <p:clrMapOvr>
+    <a:masterClrMapping/>
+  </p:clrMapOvr>
+  <mc:AlternateContent xmlns:mc="http://schemas.openxmlformats.org/markup-compatibility/2006" xmlns:p14="http://schemas.microsoft.com/office/powerpoint/2010/main">
+    <mc:Choice Requires="p14">
+      <p:transition spd="med" p14:dur="700">
+        <p:fade/>
+      </p:transition>
+    </mc:Choice>
+    <mc:Fallback xmlns="">
+      <p:transition spd="med">
+        <p:fade/>
+      </p:transition>
+    </mc:Fallback>
+  </mc:AlternateContent>
+  <p:timing>
+    <p:tnLst>
+      <p:par>
+        <p:cTn id="1" dur="indefinite" restart="never" nodeType="tmRoot"/>
+      </p:par>
+    </p:tnLst>
+  </p:timing>
+</p:sld>
+</file>
+
+<file path=ppt/slides/slide14.xml><?xml version="1.0" encoding="utf-8"?>
+<p:sld xmlns:a="http://schemas.openxmlformats.org/drawingml/2006/main" xmlns:r="http://schemas.openxmlformats.org/officeDocument/2006/relationships" xmlns:p="http://schemas.openxmlformats.org/presentationml/2006/main">
+  <p:cSld>
+    <p:spTree>
+      <p:nvGrpSpPr>
+        <p:cNvPr id="1" name=""/>
+        <p:cNvGrpSpPr/>
+        <p:nvPr/>
+      </p:nvGrpSpPr>
+      <p:grpSpPr>
+        <a:xfrm>
+          <a:off x="0" y="0"/>
+          <a:ext cx="0" cy="0"/>
+          <a:chOff x="0" y="0"/>
+          <a:chExt cx="0" cy="0"/>
+        </a:xfrm>
+      </p:grpSpPr>
+      <p:sp>
+        <p:nvSpPr>
+          <p:cNvPr id="2" name="Title 1"/>
+          <p:cNvSpPr>
+            <a:spLocks noGrp="1"/>
+          </p:cNvSpPr>
+          <p:nvPr>
+            <p:ph type="title"/>
+          </p:nvPr>
+        </p:nvSpPr>
+        <p:spPr/>
+        <p:txBody>
+          <a:bodyPr/>
+          <a:lstStyle/>
+          <a:p>
+            <a:r>
+              <a:rPr lang="en-US" dirty="0" smtClean="0"/>
               <a:t>Resources</a:t>
             </a:r>
             <a:endParaRPr lang="en-US" dirty="0"/>
@@ -17833,7 +18223,7 @@
 </p:sld>
 </file>
 
-<file path=ppt/slides/slide13.xml><?xml version="1.0" encoding="utf-8"?>
+<file path=ppt/slides/slide15.xml><?xml version="1.0" encoding="utf-8"?>
 <p:sld xmlns:a="http://schemas.openxmlformats.org/drawingml/2006/main" xmlns:r="http://schemas.openxmlformats.org/officeDocument/2006/relationships" xmlns:p="http://schemas.openxmlformats.org/presentationml/2006/main">
   <p:cSld>
     <p:spTree>
@@ -18168,7 +18558,15 @@
           <a:p>
             <a:r>
               <a:rPr lang="en-US" dirty="0"/>
-              <a:t>Express is a minimal, open source and flexible node.js web app framework designed to make developing websites, web apps and APIs much easier.</a:t>
+              <a:t>Express is a minimal, open source and flexible </a:t>
+            </a:r>
+            <a:r>
+              <a:rPr lang="en-US" dirty="0" smtClean="0"/>
+              <a:t>Node.js </a:t>
+            </a:r>
+            <a:r>
+              <a:rPr lang="en-US" dirty="0"/>
+              <a:t>web app framework designed to make developing websites, web apps and APIs much easier.</a:t>
             </a:r>
           </a:p>
           <a:p>
@@ -18638,23 +19036,70 @@
       </p:grpSpPr>
       <p:sp>
         <p:nvSpPr>
-          <p:cNvPr id="5" name="Title 4"/>
+          <p:cNvPr id="2" name="Title 1"/>
           <p:cNvSpPr>
             <a:spLocks noGrp="1"/>
           </p:cNvSpPr>
           <p:nvPr>
-            <p:ph type="ctrTitle"/>
+            <p:ph type="title"/>
           </p:nvPr>
         </p:nvSpPr>
         <p:spPr/>
         <p:txBody>
-          <a:bodyPr/>
+          <a:bodyPr>
+            <a:normAutofit fontScale="90000"/>
+          </a:bodyPr>
           <a:lstStyle/>
           <a:p>
-            <a:pPr marL="914400" indent="-914400"/>
+            <a:r>
+              <a:rPr lang="en-US" dirty="0" smtClean="0"/>
+              <a:t>Installing Node.js Tools for Visual Studio</a:t>
+            </a:r>
+            <a:endParaRPr lang="en-US" dirty="0"/>
+          </a:p>
+        </p:txBody>
+      </p:sp>
+      <p:sp>
+        <p:nvSpPr>
+          <p:cNvPr id="3" name="Content Placeholder 2"/>
+          <p:cNvSpPr>
+            <a:spLocks noGrp="1"/>
+          </p:cNvSpPr>
+          <p:nvPr>
+            <p:ph idx="1"/>
+          </p:nvPr>
+        </p:nvSpPr>
+        <p:spPr/>
+        <p:txBody>
+          <a:bodyPr>
+            <a:normAutofit/>
+          </a:bodyPr>
+          <a:lstStyle/>
+          <a:p>
+            <a:r>
+              <a:rPr lang="en-US" dirty="0" smtClean="0"/>
+              <a:t>NTVS </a:t>
+            </a:r>
             <a:r>
               <a:rPr lang="en-US" dirty="0"/>
-              <a:t>Creating a Simple Rest API</a:t>
+              <a:t>is a free, open source plugin that turns Visual Studio into a Node.js IDE. </a:t>
+            </a:r>
+            <a:endParaRPr lang="en-US" dirty="0" smtClean="0"/>
+          </a:p>
+          <a:p>
+            <a:r>
+              <a:rPr lang="en-US" dirty="0"/>
+              <a:t>NTVS comes with templates for creating Express applications.</a:t>
+            </a:r>
+          </a:p>
+          <a:p>
+            <a:r>
+              <a:rPr lang="en-US" dirty="0" smtClean="0"/>
+              <a:t>https</a:t>
+            </a:r>
+            <a:r>
+              <a:rPr lang="en-US" dirty="0"/>
+              <a:t>://nodejstools.codeplex.com/</a:t>
             </a:r>
           </a:p>
         </p:txBody>
@@ -18662,25 +19107,13 @@
     </p:spTree>
     <p:extLst>
       <p:ext uri="{BB962C8B-B14F-4D97-AF65-F5344CB8AC3E}">
-        <p14:creationId xmlns:p14="http://schemas.microsoft.com/office/powerpoint/2010/main" val="1111353972"/>
+        <p14:creationId xmlns:p14="http://schemas.microsoft.com/office/powerpoint/2010/main" val="3133251590"/>
       </p:ext>
     </p:extLst>
   </p:cSld>
   <p:clrMapOvr>
     <a:masterClrMapping/>
   </p:clrMapOvr>
-  <mc:AlternateContent xmlns:mc="http://schemas.openxmlformats.org/markup-compatibility/2006" xmlns:p14="http://schemas.microsoft.com/office/powerpoint/2010/main">
-    <mc:Choice Requires="p14">
-      <p:transition spd="med" p14:dur="700">
-        <p:fade/>
-      </p:transition>
-    </mc:Choice>
-    <mc:Fallback xmlns="">
-      <p:transition spd="med">
-        <p:fade/>
-      </p:transition>
-    </mc:Fallback>
-  </mc:AlternateContent>
   <p:timing>
     <p:tnLst>
       <p:par>
@@ -18710,50 +19143,12 @@
       </p:grpSpPr>
       <p:sp>
         <p:nvSpPr>
-          <p:cNvPr id="4" name="Rectangle 3"/>
-          <p:cNvSpPr/>
-          <p:nvPr/>
-        </p:nvSpPr>
-        <p:spPr>
-          <a:xfrm>
-            <a:off x="560798" y="5477691"/>
-            <a:ext cx="7294333" cy="614884"/>
-          </a:xfrm>
-          <a:prstGeom prst="rect">
-            <a:avLst/>
-          </a:prstGeom>
-        </p:spPr>
-        <p:style>
-          <a:lnRef idx="2">
-            <a:schemeClr val="dk1"/>
-          </a:lnRef>
-          <a:fillRef idx="1">
-            <a:schemeClr val="lt1"/>
-          </a:fillRef>
-          <a:effectRef idx="0">
-            <a:schemeClr val="dk1"/>
-          </a:effectRef>
-          <a:fontRef idx="minor">
-            <a:schemeClr val="dk1"/>
-          </a:fontRef>
-        </p:style>
-        <p:txBody>
-          <a:bodyPr rtlCol="0" anchor="ctr"/>
-          <a:lstStyle/>
-          <a:p>
-            <a:pPr algn="ctr"/>
-            <a:endParaRPr lang="en-US"/>
-          </a:p>
-        </p:txBody>
-      </p:sp>
-      <p:sp>
-        <p:nvSpPr>
-          <p:cNvPr id="2" name="Title 1"/>
+          <p:cNvPr id="5" name="Title 4"/>
           <p:cNvSpPr>
             <a:spLocks noGrp="1"/>
           </p:cNvSpPr>
           <p:nvPr>
-            <p:ph type="title"/>
+            <p:ph type="ctrTitle"/>
           </p:nvPr>
         </p:nvSpPr>
         <p:spPr/>
@@ -18761,219 +19156,18 @@
           <a:bodyPr/>
           <a:lstStyle/>
           <a:p>
-            <a:r>
-              <a:rPr lang="en-US" dirty="0" smtClean="0"/>
-              <a:t>Explanation of Routes</a:t>
-            </a:r>
-            <a:endParaRPr lang="en-US" dirty="0"/>
-          </a:p>
-        </p:txBody>
-      </p:sp>
-      <p:sp>
-        <p:nvSpPr>
-          <p:cNvPr id="3" name="Content Placeholder 2"/>
-          <p:cNvSpPr>
-            <a:spLocks noGrp="1"/>
-          </p:cNvSpPr>
-          <p:nvPr>
-            <p:ph idx="1"/>
-          </p:nvPr>
-        </p:nvSpPr>
-        <p:spPr/>
-        <p:txBody>
-          <a:bodyPr>
-            <a:normAutofit fontScale="92500"/>
-          </a:bodyPr>
-          <a:lstStyle/>
-          <a:p>
-            <a:r>
-              <a:rPr lang="en-US" dirty="0" smtClean="0"/>
-              <a:t>A router maps HTTP requests to a callback. </a:t>
-            </a:r>
-          </a:p>
-          <a:p>
-            <a:r>
-              <a:rPr lang="en-US" dirty="0" smtClean="0"/>
-              <a:t>HTTP requests can be sent as GET/POST/PUT/DELETE, etc.</a:t>
-            </a:r>
-          </a:p>
-          <a:p>
-            <a:r>
-              <a:rPr lang="en-US" dirty="0" smtClean="0"/>
-              <a:t>URLs describe the location targeted. </a:t>
-            </a:r>
-          </a:p>
-          <a:p>
-            <a:r>
-              <a:rPr lang="en-US" dirty="0" smtClean="0"/>
-              <a:t>Node helps you map a HTTP GET request like: </a:t>
-            </a:r>
-          </a:p>
-          <a:p>
-            <a:pPr lvl="1"/>
-            <a:r>
-              <a:rPr lang="en-US" dirty="0" smtClean="0"/>
-              <a:t>http://localhost:8888/index</a:t>
-            </a:r>
-          </a:p>
-          <a:p>
-            <a:r>
-              <a:rPr lang="en-US" dirty="0" smtClean="0"/>
-              <a:t>To a request handler (callback)</a:t>
-            </a:r>
-          </a:p>
-          <a:p>
-            <a:pPr marL="0" lvl="0" indent="0" defTabSz="914400" eaLnBrk="0" fontAlgn="base" hangingPunct="0">
-              <a:spcBef>
-                <a:spcPct val="0"/>
-              </a:spcBef>
-              <a:spcAft>
-                <a:spcPct val="0"/>
-              </a:spcAft>
-              <a:buNone/>
-            </a:pPr>
-            <a:endParaRPr lang="en-US" altLang="en-US" dirty="0" smtClean="0">
-              <a:solidFill>
-                <a:srgbClr val="000000"/>
-              </a:solidFill>
-              <a:latin typeface="Consolas" panose="020B0609020204030204" pitchFamily="49" charset="0"/>
-              <a:cs typeface="Consolas" panose="020B0609020204030204" pitchFamily="49" charset="0"/>
-            </a:endParaRPr>
-          </a:p>
-          <a:p>
-            <a:pPr marL="0" lvl="0" indent="0" defTabSz="914400" eaLnBrk="0" fontAlgn="base" hangingPunct="0">
-              <a:spcBef>
-                <a:spcPct val="0"/>
-              </a:spcBef>
-              <a:spcAft>
-                <a:spcPct val="0"/>
-              </a:spcAft>
-              <a:buNone/>
-            </a:pPr>
-            <a:r>
-              <a:rPr lang="en-US" altLang="en-US" sz="2600" dirty="0" err="1" smtClean="0">
-                <a:solidFill>
-                  <a:srgbClr val="000000"/>
-                </a:solidFill>
-                <a:latin typeface="Consolas" panose="020B0609020204030204" pitchFamily="49" charset="0"/>
-                <a:cs typeface="Consolas" panose="020B0609020204030204" pitchFamily="49" charset="0"/>
-              </a:rPr>
-              <a:t>app.</a:t>
-            </a:r>
-            <a:r>
-              <a:rPr lang="en-US" altLang="en-US" sz="2600" dirty="0" err="1" smtClean="0">
-                <a:solidFill>
-                  <a:srgbClr val="0000FF"/>
-                </a:solidFill>
-                <a:latin typeface="Consolas" panose="020B0609020204030204" pitchFamily="49" charset="0"/>
-                <a:cs typeface="Consolas" panose="020B0609020204030204" pitchFamily="49" charset="0"/>
-              </a:rPr>
-              <a:t>get</a:t>
-            </a:r>
-            <a:r>
-              <a:rPr lang="en-US" altLang="en-US" sz="2600" dirty="0" smtClean="0">
-                <a:solidFill>
-                  <a:srgbClr val="000000"/>
-                </a:solidFill>
-                <a:latin typeface="Consolas" panose="020B0609020204030204" pitchFamily="49" charset="0"/>
-                <a:cs typeface="Consolas" panose="020B0609020204030204" pitchFamily="49" charset="0"/>
-              </a:rPr>
-              <a:t>(</a:t>
-            </a:r>
-            <a:r>
-              <a:rPr lang="en-US" altLang="en-US" sz="2600" dirty="0" smtClean="0">
-                <a:solidFill>
-                  <a:srgbClr val="A31515"/>
-                </a:solidFill>
-                <a:latin typeface="Consolas" panose="020B0609020204030204" pitchFamily="49" charset="0"/>
-                <a:cs typeface="Consolas" panose="020B0609020204030204" pitchFamily="49" charset="0"/>
-              </a:rPr>
-              <a:t>'/index'</a:t>
-            </a:r>
-            <a:r>
-              <a:rPr lang="en-US" altLang="en-US" sz="2600" dirty="0" smtClean="0">
-                <a:solidFill>
-                  <a:srgbClr val="000000"/>
-                </a:solidFill>
-                <a:latin typeface="Consolas" panose="020B0609020204030204" pitchFamily="49" charset="0"/>
-                <a:cs typeface="Consolas" panose="020B0609020204030204" pitchFamily="49" charset="0"/>
-              </a:rPr>
-              <a:t>,</a:t>
-            </a:r>
-            <a:r>
-              <a:rPr lang="en-US" altLang="en-US" sz="2600" dirty="0">
-                <a:solidFill>
-                  <a:srgbClr val="000000"/>
-                </a:solidFill>
-                <a:latin typeface="Consolas" panose="020B0609020204030204" pitchFamily="49" charset="0"/>
-                <a:cs typeface="Consolas" panose="020B0609020204030204" pitchFamily="49" charset="0"/>
-              </a:rPr>
-              <a:t> </a:t>
-            </a:r>
-            <a:r>
-              <a:rPr lang="en-US" altLang="en-US" sz="2600" dirty="0">
-                <a:solidFill>
-                  <a:srgbClr val="0000FF"/>
-                </a:solidFill>
-                <a:latin typeface="Consolas" panose="020B0609020204030204" pitchFamily="49" charset="0"/>
-                <a:cs typeface="Consolas" panose="020B0609020204030204" pitchFamily="49" charset="0"/>
-              </a:rPr>
-              <a:t>function</a:t>
-            </a:r>
-            <a:r>
-              <a:rPr lang="en-US" altLang="en-US" sz="2600" dirty="0">
-                <a:solidFill>
-                  <a:srgbClr val="000000"/>
-                </a:solidFill>
-                <a:latin typeface="Consolas" panose="020B0609020204030204" pitchFamily="49" charset="0"/>
-                <a:cs typeface="Consolas" panose="020B0609020204030204" pitchFamily="49" charset="0"/>
-              </a:rPr>
-              <a:t> (</a:t>
-            </a:r>
-            <a:r>
-              <a:rPr lang="en-US" altLang="en-US" sz="2600" dirty="0" err="1">
-                <a:solidFill>
-                  <a:srgbClr val="000000"/>
-                </a:solidFill>
-                <a:latin typeface="Consolas" panose="020B0609020204030204" pitchFamily="49" charset="0"/>
-                <a:cs typeface="Consolas" panose="020B0609020204030204" pitchFamily="49" charset="0"/>
-              </a:rPr>
-              <a:t>req</a:t>
-            </a:r>
-            <a:r>
-              <a:rPr lang="en-US" altLang="en-US" sz="2600" dirty="0">
-                <a:solidFill>
-                  <a:srgbClr val="000000"/>
-                </a:solidFill>
-                <a:latin typeface="Consolas" panose="020B0609020204030204" pitchFamily="49" charset="0"/>
-                <a:cs typeface="Consolas" panose="020B0609020204030204" pitchFamily="49" charset="0"/>
-              </a:rPr>
-              <a:t>, res) </a:t>
-            </a:r>
-            <a:r>
-              <a:rPr lang="en-US" altLang="en-US" sz="2600" dirty="0" smtClean="0">
-                <a:solidFill>
-                  <a:srgbClr val="000000"/>
-                </a:solidFill>
-                <a:latin typeface="Consolas" panose="020B0609020204030204" pitchFamily="49" charset="0"/>
-                <a:cs typeface="Consolas" panose="020B0609020204030204" pitchFamily="49" charset="0"/>
-              </a:rPr>
-              <a:t>{});</a:t>
-            </a:r>
-            <a:endParaRPr lang="en-US" altLang="en-US" dirty="0">
-              <a:solidFill>
-                <a:srgbClr val="000000"/>
-              </a:solidFill>
-              <a:latin typeface="Consolas" panose="020B0609020204030204" pitchFamily="49" charset="0"/>
-              <a:cs typeface="Consolas" panose="020B0609020204030204" pitchFamily="49" charset="0"/>
-            </a:endParaRPr>
+            <a:pPr marL="914400" indent="-914400"/>
+            <a:r>
+              <a:rPr lang="en-US" dirty="0"/>
+              <a:t>Creating a Simple Rest API</a:t>
+            </a:r>
           </a:p>
         </p:txBody>
       </p:sp>
     </p:spTree>
     <p:extLst>
       <p:ext uri="{BB962C8B-B14F-4D97-AF65-F5344CB8AC3E}">
-        <p14:creationId xmlns:p14="http://schemas.microsoft.com/office/powerpoint/2010/main" val="4077999751"/>
+        <p14:creationId xmlns:p14="http://schemas.microsoft.com/office/powerpoint/2010/main" val="1111353972"/>
       </p:ext>
     </p:extLst>
   </p:cSld>
@@ -21025,21 +21219,6 @@
 </file>
 
 <file path=customXml/item1.xml><?xml version="1.0" encoding="utf-8"?>
-<?mso-contentType ?>
-<FormTemplates xmlns="http://schemas.microsoft.com/sharepoint/v3/contenttype/forms">
-  <Display>DocumentLibraryForm</Display>
-  <Edit>DocumentLibraryForm</Edit>
-  <New>DocumentLibraryForm</New>
-</FormTemplates>
-</file>
-
-<file path=customXml/item2.xml><?xml version="1.0" encoding="utf-8"?>
-<p:properties xmlns:p="http://schemas.microsoft.com/office/2006/metadata/properties" xmlns:xsi="http://www.w3.org/2001/XMLSchema-instance" xmlns:pc="http://schemas.microsoft.com/office/infopath/2007/PartnerControls">
-  <documentManagement/>
-</p:properties>
-</file>
-
-<file path=customXml/item3.xml><?xml version="1.0" encoding="utf-8"?>
 <ct:contentTypeSchema xmlns:ct="http://schemas.microsoft.com/office/2006/metadata/contentType" xmlns:ma="http://schemas.microsoft.com/office/2006/metadata/properties/metaAttributes" ct:_="" ma:_="" ma:contentTypeName="Document" ma:contentTypeID="0x010100391E57C78B9F604FB8BAD296D1460E2A" ma:contentTypeVersion="1" ma:contentTypeDescription="Create a new document." ma:contentTypeScope="" ma:versionID="fb382fe2362acd2155f454904f478e4d">
   <xsd:schema xmlns:xsd="http://www.w3.org/2001/XMLSchema" xmlns:xs="http://www.w3.org/2001/XMLSchema" xmlns:p="http://schemas.microsoft.com/office/2006/metadata/properties" xmlns:ns3="636b0322-90fb-440c-9cbc-22749e7231e9" targetNamespace="http://schemas.microsoft.com/office/2006/metadata/properties" ma:root="true" ma:fieldsID="b9887c63ce4710c1aeb75a5f03aecb69" ns3:_="">
     <xsd:import namespace="636b0322-90fb-440c-9cbc-22749e7231e9"/>
@@ -21179,10 +21358,35 @@
 </ct:contentTypeSchema>
 </file>
 
+<file path=customXml/item2.xml><?xml version="1.0" encoding="utf-8"?>
+<p:properties xmlns:p="http://schemas.microsoft.com/office/2006/metadata/properties" xmlns:xsi="http://www.w3.org/2001/XMLSchema-instance" xmlns:pc="http://schemas.microsoft.com/office/infopath/2007/PartnerControls">
+  <documentManagement/>
+</p:properties>
+</file>
+
+<file path=customXml/item3.xml><?xml version="1.0" encoding="utf-8"?>
+<?mso-contentType ?>
+<FormTemplates xmlns="http://schemas.microsoft.com/sharepoint/v3/contenttype/forms">
+  <Display>DocumentLibraryForm</Display>
+  <Edit>DocumentLibraryForm</Edit>
+  <New>DocumentLibraryForm</New>
+</FormTemplates>
+</file>
+
 <file path=customXml/itemProps1.xml><?xml version="1.0" encoding="utf-8"?>
-<ds:datastoreItem xmlns:ds="http://schemas.openxmlformats.org/officeDocument/2006/customXml" ds:itemID="{B0CA13EC-1D3C-4D6F-8D1C-E8A452CFC79A}">
+<ds:datastoreItem xmlns:ds="http://schemas.openxmlformats.org/officeDocument/2006/customXml" ds:itemID="{7B70CE0C-0988-423A-BF66-B40F6A1061FF}">
   <ds:schemaRefs>
-    <ds:schemaRef ds:uri="http://schemas.microsoft.com/sharepoint/v3/contenttype/forms"/>
+    <ds:schemaRef ds:uri="http://schemas.microsoft.com/office/2006/metadata/contentType"/>
+    <ds:schemaRef ds:uri="http://schemas.microsoft.com/office/2006/metadata/properties/metaAttributes"/>
+    <ds:schemaRef ds:uri="http://www.w3.org/2001/XMLSchema"/>
+    <ds:schemaRef ds:uri="http://schemas.microsoft.com/office/2006/metadata/properties"/>
+    <ds:schemaRef ds:uri="636b0322-90fb-440c-9cbc-22749e7231e9"/>
+    <ds:schemaRef ds:uri="http://schemas.microsoft.com/office/2006/documentManagement/types"/>
+    <ds:schemaRef ds:uri="http://schemas.microsoft.com/office/infopath/2007/PartnerControls"/>
+    <ds:schemaRef ds:uri="http://schemas.openxmlformats.org/package/2006/metadata/core-properties"/>
+    <ds:schemaRef ds:uri="http://purl.org/dc/elements/1.1/"/>
+    <ds:schemaRef ds:uri="http://purl.org/dc/terms/"/>
+    <ds:schemaRef ds:uri="http://schemas.microsoft.com/internal/obd"/>
   </ds:schemaRefs>
 </ds:datastoreItem>
 </file>
@@ -21204,19 +21408,9 @@
 </file>
 
 <file path=customXml/itemProps3.xml><?xml version="1.0" encoding="utf-8"?>
-<ds:datastoreItem xmlns:ds="http://schemas.openxmlformats.org/officeDocument/2006/customXml" ds:itemID="{7B70CE0C-0988-423A-BF66-B40F6A1061FF}">
+<ds:datastoreItem xmlns:ds="http://schemas.openxmlformats.org/officeDocument/2006/customXml" ds:itemID="{B0CA13EC-1D3C-4D6F-8D1C-E8A452CFC79A}">
   <ds:schemaRefs>
-    <ds:schemaRef ds:uri="http://schemas.microsoft.com/office/2006/metadata/contentType"/>
-    <ds:schemaRef ds:uri="http://schemas.microsoft.com/office/2006/metadata/properties/metaAttributes"/>
-    <ds:schemaRef ds:uri="http://www.w3.org/2001/XMLSchema"/>
-    <ds:schemaRef ds:uri="http://schemas.microsoft.com/office/2006/metadata/properties"/>
-    <ds:schemaRef ds:uri="636b0322-90fb-440c-9cbc-22749e7231e9"/>
-    <ds:schemaRef ds:uri="http://schemas.microsoft.com/office/2006/documentManagement/types"/>
-    <ds:schemaRef ds:uri="http://schemas.microsoft.com/office/infopath/2007/PartnerControls"/>
-    <ds:schemaRef ds:uri="http://schemas.openxmlformats.org/package/2006/metadata/core-properties"/>
-    <ds:schemaRef ds:uri="http://purl.org/dc/elements/1.1/"/>
-    <ds:schemaRef ds:uri="http://purl.org/dc/terms/"/>
-    <ds:schemaRef ds:uri="http://schemas.microsoft.com/internal/obd"/>
+    <ds:schemaRef ds:uri="http://schemas.microsoft.com/sharepoint/v3/contenttype/forms"/>
   </ds:schemaRefs>
 </ds:datastoreItem>
 </file>
</xml_diff>

<commit_message>
Remove slide from Intro to Express presentation. Fix code snippets in Building Backend demo.
</commit_message>
<xml_diff>
--- a/Presentation/IntroToExpress/IntroToExpress.pptx
+++ b/Presentation/IntroToExpress/IntroToExpress.pptx
@@ -223,7 +223,7 @@
           <a:p>
             <a:fld id="{312E7B4A-039C-48A2-9B2C-AF16AA3873D8}" type="datetimeFigureOut">
               <a:rPr lang="en-US" smtClean="0"/>
-              <a:t>7/21/2015</a:t>
+              <a:t>7/22/2015</a:t>
             </a:fld>
             <a:endParaRPr lang="en-US"/>
           </a:p>
@@ -388,7 +388,7 @@
           <a:p>
             <a:fld id="{DA005A0C-54D9-45AA-87D4-C551D08DFCE1}" type="datetimeFigureOut">
               <a:rPr lang="en-US" smtClean="0"/>
-              <a:t>7/21/2015</a:t>
+              <a:t>7/22/2015</a:t>
             </a:fld>
             <a:endParaRPr lang="en-US"/>
           </a:p>
@@ -17153,13 +17153,13 @@
   <p:clrMapOvr>
     <a:masterClrMapping/>
   </p:clrMapOvr>
-  <mc:AlternateContent xmlns:mc="http://schemas.openxmlformats.org/markup-compatibility/2006">
-    <mc:Choice xmlns:p14="http://schemas.microsoft.com/office/powerpoint/2010/main" Requires="p14">
+  <mc:AlternateContent xmlns:mc="http://schemas.openxmlformats.org/markup-compatibility/2006" xmlns:p14="http://schemas.microsoft.com/office/powerpoint/2010/main">
+    <mc:Choice Requires="p14">
       <p:transition spd="med" p14:dur="700">
         <p:fade/>
       </p:transition>
     </mc:Choice>
-    <mc:Fallback>
+    <mc:Fallback xmlns="">
       <p:transition spd="med">
         <p:fade/>
       </p:transition>
@@ -18367,21 +18367,19 @@
               <a:rPr lang="en-US" sz="5400" dirty="0">
                 <a:latin typeface="+mj-lt"/>
               </a:rPr>
-              <a:t>Demo: Creating a simple Rest API </a:t>
-            </a:r>
-          </a:p>
-          <a:p>
-            <a:pPr marL="742950" indent="-742950">
-              <a:lnSpc>
-                <a:spcPct val="100000"/>
-              </a:lnSpc>
-              <a:buAutoNum type="arabicParenR"/>
-            </a:pPr>
-            <a:r>
-              <a:rPr lang="en-US" sz="5400" dirty="0" err="1">
+              <a:t>Demo: Creating a simple </a:t>
+            </a:r>
+            <a:r>
+              <a:rPr lang="en-US" sz="5400">
                 <a:latin typeface="+mj-lt"/>
               </a:rPr>
-              <a:t>Templating</a:t>
+              <a:t>Rest </a:t>
+            </a:r>
+            <a:r>
+              <a:rPr lang="en-US" sz="5400" smtClean="0">
+                <a:latin typeface="+mj-lt"/>
+              </a:rPr>
+              <a:t>API</a:t>
             </a:r>
             <a:endParaRPr lang="en-US" sz="5400" dirty="0">
               <a:latin typeface="+mj-lt"/>
@@ -21219,6 +21217,12 @@
 </file>
 
 <file path=customXml/item1.xml><?xml version="1.0" encoding="utf-8"?>
+<p:properties xmlns:p="http://schemas.microsoft.com/office/2006/metadata/properties" xmlns:xsi="http://www.w3.org/2001/XMLSchema-instance" xmlns:pc="http://schemas.microsoft.com/office/infopath/2007/PartnerControls">
+  <documentManagement/>
+</p:properties>
+</file>
+
+<file path=customXml/item2.xml><?xml version="1.0" encoding="utf-8"?>
 <ct:contentTypeSchema xmlns:ct="http://schemas.microsoft.com/office/2006/metadata/contentType" xmlns:ma="http://schemas.microsoft.com/office/2006/metadata/properties/metaAttributes" ct:_="" ma:_="" ma:contentTypeName="Document" ma:contentTypeID="0x010100391E57C78B9F604FB8BAD296D1460E2A" ma:contentTypeVersion="1" ma:contentTypeDescription="Create a new document." ma:contentTypeScope="" ma:versionID="fb382fe2362acd2155f454904f478e4d">
   <xsd:schema xmlns:xsd="http://www.w3.org/2001/XMLSchema" xmlns:xs="http://www.w3.org/2001/XMLSchema" xmlns:p="http://schemas.microsoft.com/office/2006/metadata/properties" xmlns:ns3="636b0322-90fb-440c-9cbc-22749e7231e9" targetNamespace="http://schemas.microsoft.com/office/2006/metadata/properties" ma:root="true" ma:fieldsID="b9887c63ce4710c1aeb75a5f03aecb69" ns3:_="">
     <xsd:import namespace="636b0322-90fb-440c-9cbc-22749e7231e9"/>
@@ -21358,12 +21362,6 @@
 </ct:contentTypeSchema>
 </file>
 
-<file path=customXml/item2.xml><?xml version="1.0" encoding="utf-8"?>
-<p:properties xmlns:p="http://schemas.microsoft.com/office/2006/metadata/properties" xmlns:xsi="http://www.w3.org/2001/XMLSchema-instance" xmlns:pc="http://schemas.microsoft.com/office/infopath/2007/PartnerControls">
-  <documentManagement/>
-</p:properties>
-</file>
-
 <file path=customXml/item3.xml><?xml version="1.0" encoding="utf-8"?>
 <?mso-contentType ?>
 <FormTemplates xmlns="http://schemas.microsoft.com/sharepoint/v3/contenttype/forms">
@@ -21374,6 +21372,22 @@
 </file>
 
 <file path=customXml/itemProps1.xml><?xml version="1.0" encoding="utf-8"?>
+<ds:datastoreItem xmlns:ds="http://schemas.openxmlformats.org/officeDocument/2006/customXml" ds:itemID="{7025FDD9-4C58-4084-9F89-0E6ADD6FFF55}">
+  <ds:schemaRefs>
+    <ds:schemaRef ds:uri="http://schemas.microsoft.com/office/infopath/2007/PartnerControls"/>
+    <ds:schemaRef ds:uri="http://purl.org/dc/elements/1.1/"/>
+    <ds:schemaRef ds:uri="http://schemas.microsoft.com/office/2006/metadata/properties"/>
+    <ds:schemaRef ds:uri="636b0322-90fb-440c-9cbc-22749e7231e9"/>
+    <ds:schemaRef ds:uri="http://purl.org/dc/terms/"/>
+    <ds:schemaRef ds:uri="http://schemas.microsoft.com/office/2006/documentManagement/types"/>
+    <ds:schemaRef ds:uri="http://purl.org/dc/dcmitype/"/>
+    <ds:schemaRef ds:uri="http://schemas.openxmlformats.org/package/2006/metadata/core-properties"/>
+    <ds:schemaRef ds:uri="http://www.w3.org/XML/1998/namespace"/>
+  </ds:schemaRefs>
+</ds:datastoreItem>
+</file>
+
+<file path=customXml/itemProps2.xml><?xml version="1.0" encoding="utf-8"?>
 <ds:datastoreItem xmlns:ds="http://schemas.openxmlformats.org/officeDocument/2006/customXml" ds:itemID="{7B70CE0C-0988-423A-BF66-B40F6A1061FF}">
   <ds:schemaRefs>
     <ds:schemaRef ds:uri="http://schemas.microsoft.com/office/2006/metadata/contentType"/>
@@ -21391,22 +21405,6 @@
 </ds:datastoreItem>
 </file>
 
-<file path=customXml/itemProps2.xml><?xml version="1.0" encoding="utf-8"?>
-<ds:datastoreItem xmlns:ds="http://schemas.openxmlformats.org/officeDocument/2006/customXml" ds:itemID="{7025FDD9-4C58-4084-9F89-0E6ADD6FFF55}">
-  <ds:schemaRefs>
-    <ds:schemaRef ds:uri="http://schemas.microsoft.com/office/infopath/2007/PartnerControls"/>
-    <ds:schemaRef ds:uri="http://purl.org/dc/elements/1.1/"/>
-    <ds:schemaRef ds:uri="http://schemas.microsoft.com/office/2006/metadata/properties"/>
-    <ds:schemaRef ds:uri="636b0322-90fb-440c-9cbc-22749e7231e9"/>
-    <ds:schemaRef ds:uri="http://purl.org/dc/terms/"/>
-    <ds:schemaRef ds:uri="http://schemas.microsoft.com/office/2006/documentManagement/types"/>
-    <ds:schemaRef ds:uri="http://purl.org/dc/dcmitype/"/>
-    <ds:schemaRef ds:uri="http://schemas.openxmlformats.org/package/2006/metadata/core-properties"/>
-    <ds:schemaRef ds:uri="http://www.w3.org/XML/1998/namespace"/>
-  </ds:schemaRefs>
-</ds:datastoreItem>
-</file>
-
 <file path=customXml/itemProps3.xml><?xml version="1.0" encoding="utf-8"?>
 <ds:datastoreItem xmlns:ds="http://schemas.openxmlformats.org/officeDocument/2006/customXml" ds:itemID="{B0CA13EC-1D3C-4D6F-8D1C-E8A452CFC79A}">
   <ds:schemaRefs>

</xml_diff>